<commit_message>
Update my bar chart. (Kaii)
</commit_message>
<xml_diff>
--- a/PCB/09 Final/Final Presentation (VEL).pptx
+++ b/PCB/09 Final/Final Presentation (VEL).pptx
@@ -134,25 +134,12 @@
   </mc:AlternateContent>
   <c:chart>
     <c:autoTitleDeleted val="1"/>
-    <c:view3D>
-      <c:rotX val="30"/>
-      <c:rotY val="0"/>
-      <c:rAngAx val="0"/>
-      <c:perspective val="30"/>
-    </c:view3D>
-    <c:floor>
-      <c:thickness val="0"/>
-    </c:floor>
-    <c:sideWall>
-      <c:thickness val="0"/>
-    </c:sideWall>
-    <c:backWall>
-      <c:thickness val="0"/>
-    </c:backWall>
     <c:plotArea>
       <c:layout/>
-      <c:pie3DChart>
-        <c:varyColors val="1"/>
+      <c:barChart>
+        <c:barDir val="col"/>
+        <c:grouping val="clustered"/>
+        <c:varyColors val="0"/>
         <c:ser>
           <c:idx val="0"/>
           <c:order val="0"/>
@@ -167,38 +154,8 @@
               </c:strCache>
             </c:strRef>
           </c:tx>
-          <c:explosion val="25"/>
+          <c:invertIfNegative val="0"/>
           <c:dLbls>
-            <c:dLbl>
-              <c:idx val="1"/>
-              <c:layout>
-                <c:manualLayout>
-                  <c:x val="-0.187238197111264"/>
-                  <c:y val="-0.261103393575179"/>
-                </c:manualLayout>
-              </c:layout>
-              <c:showLegendKey val="0"/>
-              <c:showVal val="1"/>
-              <c:showCatName val="1"/>
-              <c:showSerName val="0"/>
-              <c:showPercent val="0"/>
-              <c:showBubbleSize val="0"/>
-            </c:dLbl>
-            <c:dLbl>
-              <c:idx val="2"/>
-              <c:layout>
-                <c:manualLayout>
-                  <c:x val="0.20621327719072"/>
-                  <c:y val="0.0359302935630493"/>
-                </c:manualLayout>
-              </c:layout>
-              <c:showLegendKey val="0"/>
-              <c:showVal val="1"/>
-              <c:showCatName val="1"/>
-              <c:showSerName val="0"/>
-              <c:showPercent val="0"/>
-              <c:showBubbleSize val="0"/>
-            </c:dLbl>
             <c:txPr>
               <a:bodyPr/>
               <a:lstStyle/>
@@ -209,13 +166,14 @@
                 <a:endParaRPr lang="en-US"/>
               </a:p>
             </c:txPr>
+            <c:dLblPos val="inEnd"/>
             <c:showLegendKey val="0"/>
             <c:showVal val="1"/>
-            <c:showCatName val="1"/>
+            <c:showCatName val="0"/>
             <c:showSerName val="0"/>
             <c:showPercent val="0"/>
             <c:showBubbleSize val="0"/>
-            <c:showLeaderLines val="1"/>
+            <c:showLeaderLines val="0"/>
           </c:dLbls>
           <c:cat>
             <c:strRef>
@@ -223,13 +181,13 @@
               <c:strCache>
                 <c:ptCount val="3"/>
                 <c:pt idx="0">
-                  <c:v>Acceptance Test</c:v>
+                  <c:v>NUnit Test</c:v>
                 </c:pt>
                 <c:pt idx="1">
                   <c:v>Function Test</c:v>
                 </c:pt>
                 <c:pt idx="2">
-                  <c:v>    NUnit Test</c:v>
+                  <c:v>Acceptance Test</c:v>
                 </c:pt>
               </c:strCache>
             </c:strRef>
@@ -241,28 +199,83 @@
                 <c:formatCode>General</c:formatCode>
                 <c:ptCount val="3"/>
                 <c:pt idx="0">
+                  <c:v>14.0</c:v>
+                </c:pt>
+                <c:pt idx="1">
                   <c:v>53.0</c:v>
                 </c:pt>
-                <c:pt idx="1">
-                  <c:v>73.0</c:v>
-                </c:pt>
                 <c:pt idx="2">
-                  <c:v>93.0</c:v>
+                  <c:v>15.0</c:v>
                 </c:pt>
               </c:numCache>
             </c:numRef>
           </c:val>
         </c:ser>
         <c:dLbls>
+          <c:dLblPos val="inEnd"/>
           <c:showLegendKey val="0"/>
           <c:showVal val="1"/>
-          <c:showCatName val="1"/>
+          <c:showCatName val="0"/>
           <c:showSerName val="0"/>
           <c:showPercent val="0"/>
           <c:showBubbleSize val="0"/>
-          <c:showLeaderLines val="1"/>
         </c:dLbls>
-      </c:pie3DChart>
+        <c:gapWidth val="150"/>
+        <c:axId val="2104607736"/>
+        <c:axId val="2021288008"/>
+      </c:barChart>
+      <c:catAx>
+        <c:axId val="2104607736"/>
+        <c:scaling>
+          <c:orientation val="minMax"/>
+        </c:scaling>
+        <c:delete val="0"/>
+        <c:axPos val="b"/>
+        <c:majorTickMark val="none"/>
+        <c:minorTickMark val="none"/>
+        <c:tickLblPos val="nextTo"/>
+        <c:txPr>
+          <a:bodyPr/>
+          <a:lstStyle/>
+          <a:p>
+            <a:pPr>
+              <a:defRPr sz="2400"/>
+            </a:pPr>
+            <a:endParaRPr lang="en-US"/>
+          </a:p>
+        </c:txPr>
+        <c:crossAx val="2021288008"/>
+        <c:auto val="1"/>
+        <c:lblAlgn val="ctr"/>
+        <c:lblOffset val="100"/>
+        <c:noMultiLvlLbl val="0"/>
+      </c:catAx>
+      <c:valAx>
+        <c:axId val="2021288008"/>
+        <c:scaling>
+          <c:orientation val="minMax"/>
+        </c:scaling>
+        <c:delete val="0"/>
+        <c:axPos val="l"/>
+        <c:majorGridlines/>
+        <c:numFmt formatCode="General" sourceLinked="1"/>
+        <c:majorTickMark val="none"/>
+        <c:minorTickMark val="none"/>
+        <c:tickLblPos val="nextTo"/>
+        <c:txPr>
+          <a:bodyPr/>
+          <a:lstStyle/>
+          <a:p>
+            <a:pPr>
+              <a:defRPr sz="2400"/>
+            </a:pPr>
+            <a:endParaRPr lang="en-US"/>
+          </a:p>
+        </c:txPr>
+        <c:crossAx val="2104607736"/>
+        <c:crossBetween val="between"/>
+        <c:minorUnit val="2.0"/>
+      </c:valAx>
     </c:plotArea>
     <c:plotVisOnly val="1"/>
     <c:dispBlanksAs val="gap"/>
@@ -4204,21 +4217,21 @@
     </dgm:pt>
   </dgm:ptLst>
   <dgm:cxnLst>
-    <dgm:cxn modelId="{05750A63-4A3C-9A4D-A3AC-F49DA48EF246}" type="presOf" srcId="{16F69D2B-1D61-044B-B907-2BC496489CA2}" destId="{08767A90-FC64-A640-AB10-F397ACBFCD39}" srcOrd="0" destOrd="0" presId="urn:microsoft.com/office/officeart/2005/8/layout/vList2"/>
+    <dgm:cxn modelId="{84544EE7-8CB1-AF42-9FBB-691C7DEF80DE}" type="presOf" srcId="{635710EA-A60C-164E-8640-52B6C841BC9E}" destId="{857336E1-C502-164D-B27E-204B55F12B46}" srcOrd="0" destOrd="0" presId="urn:microsoft.com/office/officeart/2005/8/layout/vList2"/>
+    <dgm:cxn modelId="{A558A68E-F4B9-9C4F-80E4-1482A3F6EAF6}" type="presOf" srcId="{65E35284-295B-C64C-88E5-B8163F602EF9}" destId="{D0FD7599-9CD0-B444-A2FB-F138B112482A}" srcOrd="0" destOrd="2" presId="urn:microsoft.com/office/officeart/2005/8/layout/vList2"/>
+    <dgm:cxn modelId="{733EB60D-21D2-EC44-B0D9-2A4008B02C95}" type="presOf" srcId="{31EF168A-75A2-E448-A575-CFF9572854DB}" destId="{440EE334-38B5-F140-B895-40C7D631FE65}" srcOrd="0" destOrd="0" presId="urn:microsoft.com/office/officeart/2005/8/layout/vList2"/>
+    <dgm:cxn modelId="{7498D8CC-800F-EA4E-BCDD-E909A176BB0A}" type="presOf" srcId="{5BA38324-039F-FF46-B3AA-A603FB72246C}" destId="{D0FD7599-9CD0-B444-A2FB-F138B112482A}" srcOrd="0" destOrd="0" presId="urn:microsoft.com/office/officeart/2005/8/layout/vList2"/>
+    <dgm:cxn modelId="{C26C5B19-20CC-604C-8AB0-B3BDA2C0037D}" srcId="{16F69D2B-1D61-044B-B907-2BC496489CA2}" destId="{8E121E5C-904E-B445-912F-7DD49750F2F9}" srcOrd="1" destOrd="0" parTransId="{90AC7133-AB70-AE4B-B954-A9B382CFD2BF}" sibTransId="{6E97980D-69A1-D14D-AC80-28DBDC439478}"/>
+    <dgm:cxn modelId="{BE1853BA-E4B9-8141-BC44-19F67F520911}" type="presOf" srcId="{77A4A170-B88B-8D44-A48F-8C4010B3DE79}" destId="{D0FD7599-9CD0-B444-A2FB-F138B112482A}" srcOrd="0" destOrd="3" presId="urn:microsoft.com/office/officeart/2005/8/layout/vList2"/>
+    <dgm:cxn modelId="{FE654A1D-AE61-7B44-BA0D-5FBDAAC53D0F}" srcId="{16F69D2B-1D61-044B-B907-2BC496489CA2}" destId="{65E35284-295B-C64C-88E5-B8163F602EF9}" srcOrd="2" destOrd="0" parTransId="{AE1BA247-3926-794A-A6D5-D60EE7B21C27}" sibTransId="{8BB72BF5-8152-8D4D-AF77-D6A4CD93DCC3}"/>
+    <dgm:cxn modelId="{5ABD33AD-F9B3-174A-9BEB-2DA5138FD2C5}" type="presOf" srcId="{8E121E5C-904E-B445-912F-7DD49750F2F9}" destId="{D0FD7599-9CD0-B444-A2FB-F138B112482A}" srcOrd="0" destOrd="1" presId="urn:microsoft.com/office/officeart/2005/8/layout/vList2"/>
+    <dgm:cxn modelId="{263E0935-4E5A-2848-A15A-220653DB801E}" srcId="{635710EA-A60C-164E-8640-52B6C841BC9E}" destId="{16F69D2B-1D61-044B-B907-2BC496489CA2}" srcOrd="1" destOrd="0" parTransId="{7D6C4DB7-78AF-B244-87DE-C8359DD86E19}" sibTransId="{19F9BD0B-86E8-A344-B6F0-49FA00C169C2}"/>
+    <dgm:cxn modelId="{E4D4FFB0-1522-7C47-9290-C1EE54978958}" srcId="{16F69D2B-1D61-044B-B907-2BC496489CA2}" destId="{5BA38324-039F-FF46-B3AA-A603FB72246C}" srcOrd="0" destOrd="0" parTransId="{A2F46C4A-2BF0-9F4F-AC10-266B821DE910}" sibTransId="{B794A424-0D01-E646-BB7D-745C7E0913A5}"/>
     <dgm:cxn modelId="{D49B37DF-535E-8847-8C2C-E8757CA3838E}" srcId="{635710EA-A60C-164E-8640-52B6C841BC9E}" destId="{31EF168A-75A2-E448-A575-CFF9572854DB}" srcOrd="0" destOrd="0" parTransId="{0FA76EBC-F30E-BF48-BDDF-285AE21F4E5D}" sibTransId="{B665234A-BF19-684B-8DD4-F37311963C12}"/>
     <dgm:cxn modelId="{F47196EF-5B4D-CB44-B08D-39CAA41B1DFD}" type="presOf" srcId="{695F007A-BED9-D040-92EE-6D3D1D9E402A}" destId="{72FBFCEB-0DE1-5049-96FC-8A5D2AF08E2D}" srcOrd="0" destOrd="0" presId="urn:microsoft.com/office/officeart/2005/8/layout/vList2"/>
-    <dgm:cxn modelId="{C26C5B19-20CC-604C-8AB0-B3BDA2C0037D}" srcId="{16F69D2B-1D61-044B-B907-2BC496489CA2}" destId="{8E121E5C-904E-B445-912F-7DD49750F2F9}" srcOrd="1" destOrd="0" parTransId="{90AC7133-AB70-AE4B-B954-A9B382CFD2BF}" sibTransId="{6E97980D-69A1-D14D-AC80-28DBDC439478}"/>
+    <dgm:cxn modelId="{05750A63-4A3C-9A4D-A3AC-F49DA48EF246}" type="presOf" srcId="{16F69D2B-1D61-044B-B907-2BC496489CA2}" destId="{08767A90-FC64-A640-AB10-F397ACBFCD39}" srcOrd="0" destOrd="0" presId="urn:microsoft.com/office/officeart/2005/8/layout/vList2"/>
+    <dgm:cxn modelId="{CBECD9F6-F133-BB43-9584-9C7DDB9F546E}" srcId="{16F69D2B-1D61-044B-B907-2BC496489CA2}" destId="{77A4A170-B88B-8D44-A48F-8C4010B3DE79}" srcOrd="3" destOrd="0" parTransId="{8F5409DE-5454-5E43-8B6F-E9F8BF989B31}" sibTransId="{12F9B7CD-4D3B-9347-B78E-83D76CB4DC0D}"/>
     <dgm:cxn modelId="{8C1EFD26-6248-934B-B143-5259D0255B7F}" srcId="{31EF168A-75A2-E448-A575-CFF9572854DB}" destId="{695F007A-BED9-D040-92EE-6D3D1D9E402A}" srcOrd="0" destOrd="0" parTransId="{373D84C7-85EB-B349-96AD-F68C63454E64}" sibTransId="{9766473D-5357-0844-B789-47FE6D84D1FB}"/>
-    <dgm:cxn modelId="{E4D4FFB0-1522-7C47-9290-C1EE54978958}" srcId="{16F69D2B-1D61-044B-B907-2BC496489CA2}" destId="{5BA38324-039F-FF46-B3AA-A603FB72246C}" srcOrd="0" destOrd="0" parTransId="{A2F46C4A-2BF0-9F4F-AC10-266B821DE910}" sibTransId="{B794A424-0D01-E646-BB7D-745C7E0913A5}"/>
-    <dgm:cxn modelId="{5ABD33AD-F9B3-174A-9BEB-2DA5138FD2C5}" type="presOf" srcId="{8E121E5C-904E-B445-912F-7DD49750F2F9}" destId="{D0FD7599-9CD0-B444-A2FB-F138B112482A}" srcOrd="0" destOrd="1" presId="urn:microsoft.com/office/officeart/2005/8/layout/vList2"/>
-    <dgm:cxn modelId="{FE654A1D-AE61-7B44-BA0D-5FBDAAC53D0F}" srcId="{16F69D2B-1D61-044B-B907-2BC496489CA2}" destId="{65E35284-295B-C64C-88E5-B8163F602EF9}" srcOrd="2" destOrd="0" parTransId="{AE1BA247-3926-794A-A6D5-D60EE7B21C27}" sibTransId="{8BB72BF5-8152-8D4D-AF77-D6A4CD93DCC3}"/>
-    <dgm:cxn modelId="{CBECD9F6-F133-BB43-9584-9C7DDB9F546E}" srcId="{16F69D2B-1D61-044B-B907-2BC496489CA2}" destId="{77A4A170-B88B-8D44-A48F-8C4010B3DE79}" srcOrd="3" destOrd="0" parTransId="{8F5409DE-5454-5E43-8B6F-E9F8BF989B31}" sibTransId="{12F9B7CD-4D3B-9347-B78E-83D76CB4DC0D}"/>
-    <dgm:cxn modelId="{733EB60D-21D2-EC44-B0D9-2A4008B02C95}" type="presOf" srcId="{31EF168A-75A2-E448-A575-CFF9572854DB}" destId="{440EE334-38B5-F140-B895-40C7D631FE65}" srcOrd="0" destOrd="0" presId="urn:microsoft.com/office/officeart/2005/8/layout/vList2"/>
-    <dgm:cxn modelId="{BE1853BA-E4B9-8141-BC44-19F67F520911}" type="presOf" srcId="{77A4A170-B88B-8D44-A48F-8C4010B3DE79}" destId="{D0FD7599-9CD0-B444-A2FB-F138B112482A}" srcOrd="0" destOrd="3" presId="urn:microsoft.com/office/officeart/2005/8/layout/vList2"/>
-    <dgm:cxn modelId="{7498D8CC-800F-EA4E-BCDD-E909A176BB0A}" type="presOf" srcId="{5BA38324-039F-FF46-B3AA-A603FB72246C}" destId="{D0FD7599-9CD0-B444-A2FB-F138B112482A}" srcOrd="0" destOrd="0" presId="urn:microsoft.com/office/officeart/2005/8/layout/vList2"/>
-    <dgm:cxn modelId="{263E0935-4E5A-2848-A15A-220653DB801E}" srcId="{635710EA-A60C-164E-8640-52B6C841BC9E}" destId="{16F69D2B-1D61-044B-B907-2BC496489CA2}" srcOrd="1" destOrd="0" parTransId="{7D6C4DB7-78AF-B244-87DE-C8359DD86E19}" sibTransId="{19F9BD0B-86E8-A344-B6F0-49FA00C169C2}"/>
-    <dgm:cxn modelId="{A558A68E-F4B9-9C4F-80E4-1482A3F6EAF6}" type="presOf" srcId="{65E35284-295B-C64C-88E5-B8163F602EF9}" destId="{D0FD7599-9CD0-B444-A2FB-F138B112482A}" srcOrd="0" destOrd="2" presId="urn:microsoft.com/office/officeart/2005/8/layout/vList2"/>
-    <dgm:cxn modelId="{84544EE7-8CB1-AF42-9FBB-691C7DEF80DE}" type="presOf" srcId="{635710EA-A60C-164E-8640-52B6C841BC9E}" destId="{857336E1-C502-164D-B27E-204B55F12B46}" srcOrd="0" destOrd="0" presId="urn:microsoft.com/office/officeart/2005/8/layout/vList2"/>
     <dgm:cxn modelId="{BCE58D41-ECB0-294E-9134-AC9D8720790A}" type="presParOf" srcId="{857336E1-C502-164D-B27E-204B55F12B46}" destId="{440EE334-38B5-F140-B895-40C7D631FE65}" srcOrd="0" destOrd="0" presId="urn:microsoft.com/office/officeart/2005/8/layout/vList2"/>
     <dgm:cxn modelId="{BD84EAA5-4DD0-0B41-B77C-A5B477A3CABC}" type="presParOf" srcId="{857336E1-C502-164D-B27E-204B55F12B46}" destId="{72FBFCEB-0DE1-5049-96FC-8A5D2AF08E2D}" srcOrd="1" destOrd="0" presId="urn:microsoft.com/office/officeart/2005/8/layout/vList2"/>
     <dgm:cxn modelId="{48365F96-0A0F-B249-B11E-48CD8ACACF71}" type="presParOf" srcId="{857336E1-C502-164D-B27E-204B55F12B46}" destId="{08767A90-FC64-A640-AB10-F397ACBFCD39}" srcOrd="2" destOrd="0" presId="urn:microsoft.com/office/officeart/2005/8/layout/vList2"/>
@@ -16382,21 +16395,7 @@
                 <a:latin typeface="Arial" panose="020B0604020202020204" pitchFamily="34" charset="0"/>
                 <a:cs typeface="Arial" panose="020B0604020202020204" pitchFamily="34" charset="0"/>
               </a:rPr>
-              <a:t>Finalised </a:t>
-            </a:r>
-            <a:r>
-              <a:rPr lang="en-IN" sz="2400" dirty="0" smtClean="0">
-                <a:latin typeface="Arial" panose="020B0604020202020204" pitchFamily="34" charset="0"/>
-                <a:cs typeface="Arial" panose="020B0604020202020204" pitchFamily="34" charset="0"/>
-              </a:rPr>
-              <a:t>Success Story </a:t>
-            </a:r>
-            <a:r>
-              <a:rPr lang="en-IN" sz="2400" dirty="0" smtClean="0">
-                <a:latin typeface="Arial" panose="020B0604020202020204" pitchFamily="34" charset="0"/>
-                <a:cs typeface="Arial" panose="020B0604020202020204" pitchFamily="34" charset="0"/>
-              </a:rPr>
-              <a:t>Categories</a:t>
+              <a:t>Finalised Success Story Categories</a:t>
             </a:r>
             <a:endParaRPr lang="en-IN" sz="1100" dirty="0" smtClean="0">
               <a:latin typeface="Arial" panose="020B0604020202020204" pitchFamily="34" charset="0"/>
@@ -16413,19 +16412,8 @@
                 <a:latin typeface="Arial" panose="020B0604020202020204" pitchFamily="34" charset="0"/>
                 <a:cs typeface="Arial" panose="020B0604020202020204" pitchFamily="34" charset="0"/>
               </a:rPr>
-              <a:t>Real time data incorporated in the </a:t>
+              <a:t>Real time data incorporated in the DB</a:t>
             </a:r>
-            <a:r>
-              <a:rPr lang="en-IN" sz="2400" dirty="0" smtClean="0">
-                <a:latin typeface="Arial" panose="020B0604020202020204" pitchFamily="34" charset="0"/>
-                <a:cs typeface="Arial" panose="020B0604020202020204" pitchFamily="34" charset="0"/>
-              </a:rPr>
-              <a:t>DB</a:t>
-            </a:r>
-            <a:endParaRPr lang="en-IN" sz="2400" dirty="0" smtClean="0">
-              <a:latin typeface="Arial" panose="020B0604020202020204" pitchFamily="34" charset="0"/>
-              <a:cs typeface="Arial" panose="020B0604020202020204" pitchFamily="34" charset="0"/>
-            </a:endParaRPr>
           </a:p>
           <a:p>
             <a:pPr marL="342900" indent="-342900">
@@ -16437,19 +16425,8 @@
                 <a:latin typeface="Arial" panose="020B0604020202020204" pitchFamily="34" charset="0"/>
                 <a:cs typeface="Arial" panose="020B0604020202020204" pitchFamily="34" charset="0"/>
               </a:rPr>
-              <a:t>Dynamic data / Real-time data is used in Success Stories, depending upon the user </a:t>
+              <a:t>Dynamic data / Real-time data is used in Success Stories, depending upon the user selection</a:t>
             </a:r>
-            <a:r>
-              <a:rPr lang="en-IN" sz="2400" dirty="0" smtClean="0">
-                <a:latin typeface="Arial" panose="020B0604020202020204" pitchFamily="34" charset="0"/>
-                <a:cs typeface="Arial" panose="020B0604020202020204" pitchFamily="34" charset="0"/>
-              </a:rPr>
-              <a:t>selection</a:t>
-            </a:r>
-            <a:endParaRPr lang="en-IN" sz="2400" dirty="0" smtClean="0">
-              <a:latin typeface="Arial" panose="020B0604020202020204" pitchFamily="34" charset="0"/>
-              <a:cs typeface="Arial" panose="020B0604020202020204" pitchFamily="34" charset="0"/>
-            </a:endParaRPr>
           </a:p>
           <a:p>
             <a:pPr marL="342900" indent="-342900">
@@ -17135,14 +17112,7 @@
                 <a:latin typeface="Arial" panose="020B0604020202020204" pitchFamily="34" charset="0"/>
                 <a:cs typeface="Arial" panose="020B0604020202020204" pitchFamily="34" charset="0"/>
               </a:rPr>
-              <a:t>Detail </a:t>
-            </a:r>
-            <a:r>
-              <a:rPr lang="en-IN" sz="2400" dirty="0" smtClean="0">
-                <a:latin typeface="Arial" panose="020B0604020202020204" pitchFamily="34" charset="0"/>
-                <a:cs typeface="Arial" panose="020B0604020202020204" pitchFamily="34" charset="0"/>
-              </a:rPr>
-              <a:t>view of Success Story is Dynamic / Real time data.</a:t>
+              <a:t>Detail view of Success Story is Dynamic / Real time data.</a:t>
             </a:r>
           </a:p>
           <a:p>
@@ -17554,14 +17524,7 @@
                 <a:latin typeface="Arial" panose="020B0604020202020204" pitchFamily="34" charset="0"/>
                 <a:cs typeface="Arial" panose="020B0604020202020204" pitchFamily="34" charset="0"/>
               </a:rPr>
-              <a:t>In future an app can be developed, that contains details about GetSkills, which can be added to GetSkills website and visitors can download the </a:t>
-            </a:r>
-            <a:r>
-              <a:rPr lang="en-IN" sz="2400" dirty="0" smtClean="0">
-                <a:latin typeface="Arial" panose="020B0604020202020204" pitchFamily="34" charset="0"/>
-                <a:cs typeface="Arial" panose="020B0604020202020204" pitchFamily="34" charset="0"/>
-              </a:rPr>
-              <a:t>same</a:t>
+              <a:t>In future an app can be developed, that contains details about GetSkills, which can be added to GetSkills website and visitors can download the same</a:t>
             </a:r>
           </a:p>
           <a:p>
@@ -18208,15 +18171,7 @@
                   <a:srgbClr val="FFFFFF"/>
                 </a:solidFill>
               </a:rPr>
-              <a:t> </a:t>
-            </a:r>
-            <a:r>
-              <a:rPr sz="3200" dirty="0" smtClean="0">
-                <a:solidFill>
-                  <a:srgbClr val="FFFFFF"/>
-                </a:solidFill>
-              </a:rPr>
-              <a:t>link</a:t>
+              <a:t> link</a:t>
             </a:r>
           </a:p>
           <a:p>
@@ -18724,7 +18679,11 @@
             <a:pPr algn="l"/>
             <a:r>
               <a:rPr lang="en-US" dirty="0" smtClean="0"/>
-              <a:t>8. Testing</a:t>
+              <a:t>8. </a:t>
+            </a:r>
+            <a:r>
+              <a:rPr lang="en-US" dirty="0" smtClean="0"/>
+              <a:t>Test for Team Profile</a:t>
             </a:r>
             <a:endParaRPr lang="en-US" dirty="0"/>
           </a:p>
@@ -18737,14 +18696,14 @@
           <p:nvPr>
             <p:extLst>
               <p:ext uri="{D42A27DB-BD31-4B8C-83A1-F6EECF244321}">
-                <p14:modId xmlns:p14="http://schemas.microsoft.com/office/powerpoint/2010/main" val="1965631260"/>
+                <p14:modId xmlns:p14="http://schemas.microsoft.com/office/powerpoint/2010/main" val="50037447"/>
               </p:ext>
             </p:extLst>
           </p:nvPr>
         </p:nvGraphicFramePr>
         <p:xfrm>
-          <a:off x="685800" y="1210733"/>
-          <a:ext cx="8238068" cy="5325534"/>
+          <a:off x="1373188" y="1498594"/>
+          <a:ext cx="7401772" cy="4851400"/>
         </p:xfrm>
         <a:graphic>
           <a:graphicData uri="http://schemas.openxmlformats.org/drawingml/2006/chart">
@@ -18752,6 +18711,36 @@
           </a:graphicData>
         </a:graphic>
       </p:graphicFrame>
+      <p:sp>
+        <p:nvSpPr>
+          <p:cNvPr id="5" name="TextBox 4"/>
+          <p:cNvSpPr txBox="1"/>
+          <p:nvPr/>
+        </p:nvSpPr>
+        <p:spPr>
+          <a:xfrm>
+            <a:off x="7281341" y="1267761"/>
+            <a:ext cx="1493618" cy="461665"/>
+          </a:xfrm>
+          <a:prstGeom prst="rect">
+            <a:avLst/>
+          </a:prstGeom>
+          <a:noFill/>
+        </p:spPr>
+        <p:txBody>
+          <a:bodyPr wrap="none" rtlCol="0">
+            <a:spAutoFit/>
+          </a:bodyPr>
+          <a:lstStyle/>
+          <a:p>
+            <a:r>
+              <a:rPr lang="en-US" sz="2400" dirty="0" smtClean="0"/>
+              <a:t>Unit: case</a:t>
+            </a:r>
+            <a:endParaRPr lang="en-US" sz="2400" dirty="0"/>
+          </a:p>
+        </p:txBody>
+      </p:sp>
     </p:spTree>
     <p:extLst>
       <p:ext uri="{BB962C8B-B14F-4D97-AF65-F5344CB8AC3E}">

</xml_diff>

<commit_message>
1.Add reflection section in final report
</commit_message>
<xml_diff>
--- a/PCB/09 Final/Final Presentation (VEL).pptx
+++ b/PCB/09 Final/Final Presentation (VEL).pptx
@@ -4,6 +4,9 @@
   <p:sldMasterIdLst>
     <p:sldMasterId id="2147483696" r:id="rId1"/>
   </p:sldMasterIdLst>
+  <p:notesMasterIdLst>
+    <p:notesMasterId r:id="rId15"/>
+  </p:notesMasterIdLst>
   <p:sldIdLst>
     <p:sldId id="256" r:id="rId2"/>
     <p:sldId id="258" r:id="rId3"/>
@@ -116,13 +119,29 @@
       </a:defRPr>
     </a:lvl9pPr>
   </p:defaultTextStyle>
+  <p:extLst>
+    <p:ext uri="{EFAFB233-063F-42B5-8137-9DF3F51BA10A}">
+      <p15:sldGuideLst xmlns:p15="http://schemas.microsoft.com/office/powerpoint/2012/main">
+        <p15:guide id="1" orient="horz" pos="2160">
+          <p15:clr>
+            <a:srgbClr val="A4A3A4"/>
+          </p15:clr>
+        </p15:guide>
+        <p15:guide id="2" pos="2880">
+          <p15:clr>
+            <a:srgbClr val="A4A3A4"/>
+          </p15:clr>
+        </p15:guide>
+      </p15:sldGuideLst>
+    </p:ext>
+  </p:extLst>
 </p:presentation>
 </file>
 
 <file path=ppt/charts/chart1.xml><?xml version="1.0" encoding="utf-8"?>
 <c:chartSpace xmlns:c="http://schemas.openxmlformats.org/drawingml/2006/chart" xmlns:a="http://schemas.openxmlformats.org/drawingml/2006/main" xmlns:r="http://schemas.openxmlformats.org/officeDocument/2006/relationships">
   <c:date1904 val="0"/>
-  <c:lang val="en-US"/>
+  <c:lang val="zh-CN"/>
   <c:roundedCorners val="0"/>
   <mc:AlternateContent xmlns:mc="http://schemas.openxmlformats.org/markup-compatibility/2006">
     <mc:Choice xmlns:c14="http://schemas.microsoft.com/office/drawing/2007/8/2/chart" Requires="c14">
@@ -156,6 +175,13 @@
           </c:tx>
           <c:invertIfNegative val="0"/>
           <c:dLbls>
+            <c:spPr>
+              <a:noFill/>
+              <a:ln>
+                <a:noFill/>
+              </a:ln>
+              <a:effectLst/>
+            </c:spPr>
             <c:txPr>
               <a:bodyPr/>
               <a:lstStyle/>
@@ -174,6 +200,12 @@
             <c:showPercent val="0"/>
             <c:showBubbleSize val="0"/>
             <c:showLeaderLines val="0"/>
+            <c:extLst>
+              <c:ext xmlns:c15="http://schemas.microsoft.com/office/drawing/2012/chart" uri="{CE6537A1-D6FC-4f65-9D91-7224C49458BB}">
+                <c15:layout/>
+                <c15:showLeaderLines val="0"/>
+              </c:ext>
+            </c:extLst>
           </c:dLbls>
           <c:cat>
             <c:strRef>
@@ -199,13 +231,13 @@
                 <c:formatCode>General</c:formatCode>
                 <c:ptCount val="3"/>
                 <c:pt idx="0">
-                  <c:v>14.0</c:v>
+                  <c:v>14</c:v>
                 </c:pt>
                 <c:pt idx="1">
-                  <c:v>53.0</c:v>
+                  <c:v>53</c:v>
                 </c:pt>
                 <c:pt idx="2">
-                  <c:v>15.0</c:v>
+                  <c:v>15</c:v>
                 </c:pt>
               </c:numCache>
             </c:numRef>
@@ -221,16 +253,17 @@
           <c:showBubbleSize val="0"/>
         </c:dLbls>
         <c:gapWidth val="150"/>
-        <c:axId val="2104607736"/>
-        <c:axId val="2021288008"/>
+        <c:axId val="-1003877248"/>
+        <c:axId val="-1003878336"/>
       </c:barChart>
       <c:catAx>
-        <c:axId val="2104607736"/>
+        <c:axId val="-1003877248"/>
         <c:scaling>
           <c:orientation val="minMax"/>
         </c:scaling>
         <c:delete val="0"/>
         <c:axPos val="b"/>
+        <c:numFmt formatCode="General" sourceLinked="0"/>
         <c:majorTickMark val="none"/>
         <c:minorTickMark val="none"/>
         <c:tickLblPos val="nextTo"/>
@@ -244,14 +277,15 @@
             <a:endParaRPr lang="en-US"/>
           </a:p>
         </c:txPr>
-        <c:crossAx val="2021288008"/>
+        <c:crossAx val="-1003878336"/>
+        <c:crosses val="autoZero"/>
         <c:auto val="1"/>
         <c:lblAlgn val="ctr"/>
         <c:lblOffset val="100"/>
         <c:noMultiLvlLbl val="0"/>
       </c:catAx>
       <c:valAx>
-        <c:axId val="2021288008"/>
+        <c:axId val="-1003878336"/>
         <c:scaling>
           <c:orientation val="minMax"/>
         </c:scaling>
@@ -272,9 +306,10 @@
             <a:endParaRPr lang="en-US"/>
           </a:p>
         </c:txPr>
-        <c:crossAx val="2104607736"/>
+        <c:crossAx val="-1003877248"/>
+        <c:crosses val="autoZero"/>
         <c:crossBetween val="between"/>
-        <c:minorUnit val="2.0"/>
+        <c:minorUnit val="2"/>
       </c:valAx>
     </c:plotArea>
     <c:plotVisOnly val="1"/>
@@ -3266,7 +3301,7 @@
   <dgm:whole/>
   <dgm:extLst>
     <a:ext uri="http://schemas.microsoft.com/office/drawing/2008/diagram">
-      <dsp:dataModelExt xmlns:dsp="http://schemas.microsoft.com/office/drawing/2008/diagram" relId="rId6" minVer="http://schemas.openxmlformats.org/drawingml/2006/diagram"/>
+      <dsp:dataModelExt xmlns:dsp="http://schemas.microsoft.com/office/drawing/2008/diagram" relId="rId7" minVer="http://schemas.openxmlformats.org/drawingml/2006/diagram"/>
     </a:ext>
   </dgm:extLst>
 </dgm:dataModel>
@@ -3618,8 +3653,27 @@
       </dgm:t>
     </dgm:pt>
     <dgm:pt modelId="{8194465A-0129-49CF-BEB6-647AA1AEE877}" type="pres">
-      <dgm:prSet presAssocID="{639619A3-CC12-41B7-9997-2C5BCA9D25A8}" presName="accentRepeatNode" presStyleLbl="solidFgAcc1" presStyleIdx="0" presStyleCnt="6"/>
-      <dgm:spPr/>
+      <dgm:prSet presAssocID="{639619A3-CC12-41B7-9997-2C5BCA9D25A8}" presName="accentRepeatNode" presStyleLbl="solidFgAcc1" presStyleIdx="0" presStyleCnt="6">
+        <dgm:style>
+          <a:lnRef idx="2">
+            <a:schemeClr val="accent2">
+              <a:shade val="50000"/>
+            </a:schemeClr>
+          </a:lnRef>
+          <a:fillRef idx="1">
+            <a:schemeClr val="accent2"/>
+          </a:fillRef>
+          <a:effectRef idx="0">
+            <a:schemeClr val="accent2"/>
+          </a:effectRef>
+          <a:fontRef idx="minor">
+            <a:schemeClr val="lt1"/>
+          </a:fontRef>
+        </dgm:style>
+      </dgm:prSet>
+      <dgm:spPr>
+        <a:ln/>
+      </dgm:spPr>
       <dgm:t>
         <a:bodyPr/>
         <a:lstStyle/>
@@ -3655,7 +3709,24 @@
       </dgm:t>
     </dgm:pt>
     <dgm:pt modelId="{FD115F93-90C0-4DDC-A199-7E60E8A8D3B5}" type="pres">
-      <dgm:prSet presAssocID="{10CF04BD-5FE2-4F22-802C-701BDD20A1AA}" presName="accentRepeatNode" presStyleLbl="solidFgAcc1" presStyleIdx="1" presStyleCnt="6"/>
+      <dgm:prSet presAssocID="{10CF04BD-5FE2-4F22-802C-701BDD20A1AA}" presName="accentRepeatNode" presStyleLbl="solidFgAcc1" presStyleIdx="1" presStyleCnt="6">
+        <dgm:style>
+          <a:lnRef idx="2">
+            <a:schemeClr val="accent4">
+              <a:shade val="50000"/>
+            </a:schemeClr>
+          </a:lnRef>
+          <a:fillRef idx="1">
+            <a:schemeClr val="accent4"/>
+          </a:fillRef>
+          <a:effectRef idx="0">
+            <a:schemeClr val="accent4"/>
+          </a:effectRef>
+          <a:fontRef idx="minor">
+            <a:schemeClr val="lt1"/>
+          </a:fontRef>
+        </dgm:style>
+      </dgm:prSet>
       <dgm:spPr/>
       <dgm:t>
         <a:bodyPr/>
@@ -3692,7 +3763,24 @@
       </dgm:t>
     </dgm:pt>
     <dgm:pt modelId="{FC7CC77C-DCA0-4F8D-83AD-2C28C60A0923}" type="pres">
-      <dgm:prSet presAssocID="{7601E4DE-E850-4F6E-A13E-CB5B679EA4DC}" presName="accentRepeatNode" presStyleLbl="solidFgAcc1" presStyleIdx="2" presStyleCnt="6"/>
+      <dgm:prSet presAssocID="{7601E4DE-E850-4F6E-A13E-CB5B679EA4DC}" presName="accentRepeatNode" presStyleLbl="solidFgAcc1" presStyleIdx="2" presStyleCnt="6">
+        <dgm:style>
+          <a:lnRef idx="2">
+            <a:schemeClr val="dk1">
+              <a:shade val="50000"/>
+            </a:schemeClr>
+          </a:lnRef>
+          <a:fillRef idx="1">
+            <a:schemeClr val="dk1"/>
+          </a:fillRef>
+          <a:effectRef idx="0">
+            <a:schemeClr val="dk1"/>
+          </a:effectRef>
+          <a:fontRef idx="minor">
+            <a:schemeClr val="lt1"/>
+          </a:fontRef>
+        </dgm:style>
+      </dgm:prSet>
       <dgm:spPr/>
       <dgm:t>
         <a:bodyPr/>
@@ -3729,7 +3817,24 @@
       </dgm:t>
     </dgm:pt>
     <dgm:pt modelId="{6F9438A2-5961-4944-AF38-D53501A77CC4}" type="pres">
-      <dgm:prSet presAssocID="{17A1FB84-7A54-4FE2-A23B-E0C080DEBE50}" presName="accentRepeatNode" presStyleLbl="solidFgAcc1" presStyleIdx="3" presStyleCnt="6"/>
+      <dgm:prSet presAssocID="{17A1FB84-7A54-4FE2-A23B-E0C080DEBE50}" presName="accentRepeatNode" presStyleLbl="solidFgAcc1" presStyleIdx="3" presStyleCnt="6">
+        <dgm:style>
+          <a:lnRef idx="2">
+            <a:schemeClr val="accent4">
+              <a:shade val="50000"/>
+            </a:schemeClr>
+          </a:lnRef>
+          <a:fillRef idx="1">
+            <a:schemeClr val="accent4"/>
+          </a:fillRef>
+          <a:effectRef idx="0">
+            <a:schemeClr val="accent4"/>
+          </a:effectRef>
+          <a:fontRef idx="minor">
+            <a:schemeClr val="lt1"/>
+          </a:fontRef>
+        </dgm:style>
+      </dgm:prSet>
       <dgm:spPr/>
       <dgm:t>
         <a:bodyPr/>
@@ -3766,7 +3871,24 @@
       </dgm:t>
     </dgm:pt>
     <dgm:pt modelId="{7954660A-F333-4EF8-BA3C-6A4BBDEF1C3D}" type="pres">
-      <dgm:prSet presAssocID="{2CD8FEC5-7230-41B7-831C-5AF40D503F85}" presName="accentRepeatNode" presStyleLbl="solidFgAcc1" presStyleIdx="4" presStyleCnt="6"/>
+      <dgm:prSet presAssocID="{2CD8FEC5-7230-41B7-831C-5AF40D503F85}" presName="accentRepeatNode" presStyleLbl="solidFgAcc1" presStyleIdx="4" presStyleCnt="6">
+        <dgm:style>
+          <a:lnRef idx="2">
+            <a:schemeClr val="accent2">
+              <a:shade val="50000"/>
+            </a:schemeClr>
+          </a:lnRef>
+          <a:fillRef idx="1">
+            <a:schemeClr val="accent2"/>
+          </a:fillRef>
+          <a:effectRef idx="0">
+            <a:schemeClr val="accent2"/>
+          </a:effectRef>
+          <a:fontRef idx="minor">
+            <a:schemeClr val="lt1"/>
+          </a:fontRef>
+        </dgm:style>
+      </dgm:prSet>
       <dgm:spPr/>
       <dgm:t>
         <a:bodyPr/>
@@ -3858,7 +3980,7 @@
   <dgm:whole/>
   <dgm:extLst>
     <a:ext uri="http://schemas.microsoft.com/office/drawing/2008/diagram">
-      <dsp:dataModelExt xmlns:dsp="http://schemas.microsoft.com/office/drawing/2008/diagram" relId="rId6" minVer="http://schemas.openxmlformats.org/drawingml/2006/diagram"/>
+      <dsp:dataModelExt xmlns:dsp="http://schemas.microsoft.com/office/drawing/2008/diagram" relId="rId7" minVer="http://schemas.openxmlformats.org/drawingml/2006/diagram"/>
     </a:ext>
   </dgm:extLst>
 </dgm:dataModel>
@@ -4217,20 +4339,20 @@
     </dgm:pt>
   </dgm:ptLst>
   <dgm:cxnLst>
-    <dgm:cxn modelId="{84544EE7-8CB1-AF42-9FBB-691C7DEF80DE}" type="presOf" srcId="{635710EA-A60C-164E-8640-52B6C841BC9E}" destId="{857336E1-C502-164D-B27E-204B55F12B46}" srcOrd="0" destOrd="0" presId="urn:microsoft.com/office/officeart/2005/8/layout/vList2"/>
+    <dgm:cxn modelId="{05750A63-4A3C-9A4D-A3AC-F49DA48EF246}" type="presOf" srcId="{16F69D2B-1D61-044B-B907-2BC496489CA2}" destId="{08767A90-FC64-A640-AB10-F397ACBFCD39}" srcOrd="0" destOrd="0" presId="urn:microsoft.com/office/officeart/2005/8/layout/vList2"/>
+    <dgm:cxn modelId="{CBECD9F6-F133-BB43-9584-9C7DDB9F546E}" srcId="{16F69D2B-1D61-044B-B907-2BC496489CA2}" destId="{77A4A170-B88B-8D44-A48F-8C4010B3DE79}" srcOrd="3" destOrd="0" parTransId="{8F5409DE-5454-5E43-8B6F-E9F8BF989B31}" sibTransId="{12F9B7CD-4D3B-9347-B78E-83D76CB4DC0D}"/>
+    <dgm:cxn modelId="{733EB60D-21D2-EC44-B0D9-2A4008B02C95}" type="presOf" srcId="{31EF168A-75A2-E448-A575-CFF9572854DB}" destId="{440EE334-38B5-F140-B895-40C7D631FE65}" srcOrd="0" destOrd="0" presId="urn:microsoft.com/office/officeart/2005/8/layout/vList2"/>
     <dgm:cxn modelId="{A558A68E-F4B9-9C4F-80E4-1482A3F6EAF6}" type="presOf" srcId="{65E35284-295B-C64C-88E5-B8163F602EF9}" destId="{D0FD7599-9CD0-B444-A2FB-F138B112482A}" srcOrd="0" destOrd="2" presId="urn:microsoft.com/office/officeart/2005/8/layout/vList2"/>
-    <dgm:cxn modelId="{733EB60D-21D2-EC44-B0D9-2A4008B02C95}" type="presOf" srcId="{31EF168A-75A2-E448-A575-CFF9572854DB}" destId="{440EE334-38B5-F140-B895-40C7D631FE65}" srcOrd="0" destOrd="0" presId="urn:microsoft.com/office/officeart/2005/8/layout/vList2"/>
-    <dgm:cxn modelId="{7498D8CC-800F-EA4E-BCDD-E909A176BB0A}" type="presOf" srcId="{5BA38324-039F-FF46-B3AA-A603FB72246C}" destId="{D0FD7599-9CD0-B444-A2FB-F138B112482A}" srcOrd="0" destOrd="0" presId="urn:microsoft.com/office/officeart/2005/8/layout/vList2"/>
+    <dgm:cxn modelId="{5ABD33AD-F9B3-174A-9BEB-2DA5138FD2C5}" type="presOf" srcId="{8E121E5C-904E-B445-912F-7DD49750F2F9}" destId="{D0FD7599-9CD0-B444-A2FB-F138B112482A}" srcOrd="0" destOrd="1" presId="urn:microsoft.com/office/officeart/2005/8/layout/vList2"/>
+    <dgm:cxn modelId="{263E0935-4E5A-2848-A15A-220653DB801E}" srcId="{635710EA-A60C-164E-8640-52B6C841BC9E}" destId="{16F69D2B-1D61-044B-B907-2BC496489CA2}" srcOrd="1" destOrd="0" parTransId="{7D6C4DB7-78AF-B244-87DE-C8359DD86E19}" sibTransId="{19F9BD0B-86E8-A344-B6F0-49FA00C169C2}"/>
+    <dgm:cxn modelId="{F47196EF-5B4D-CB44-B08D-39CAA41B1DFD}" type="presOf" srcId="{695F007A-BED9-D040-92EE-6D3D1D9E402A}" destId="{72FBFCEB-0DE1-5049-96FC-8A5D2AF08E2D}" srcOrd="0" destOrd="0" presId="urn:microsoft.com/office/officeart/2005/8/layout/vList2"/>
+    <dgm:cxn modelId="{FE654A1D-AE61-7B44-BA0D-5FBDAAC53D0F}" srcId="{16F69D2B-1D61-044B-B907-2BC496489CA2}" destId="{65E35284-295B-C64C-88E5-B8163F602EF9}" srcOrd="2" destOrd="0" parTransId="{AE1BA247-3926-794A-A6D5-D60EE7B21C27}" sibTransId="{8BB72BF5-8152-8D4D-AF77-D6A4CD93DCC3}"/>
     <dgm:cxn modelId="{C26C5B19-20CC-604C-8AB0-B3BDA2C0037D}" srcId="{16F69D2B-1D61-044B-B907-2BC496489CA2}" destId="{8E121E5C-904E-B445-912F-7DD49750F2F9}" srcOrd="1" destOrd="0" parTransId="{90AC7133-AB70-AE4B-B954-A9B382CFD2BF}" sibTransId="{6E97980D-69A1-D14D-AC80-28DBDC439478}"/>
     <dgm:cxn modelId="{BE1853BA-E4B9-8141-BC44-19F67F520911}" type="presOf" srcId="{77A4A170-B88B-8D44-A48F-8C4010B3DE79}" destId="{D0FD7599-9CD0-B444-A2FB-F138B112482A}" srcOrd="0" destOrd="3" presId="urn:microsoft.com/office/officeart/2005/8/layout/vList2"/>
-    <dgm:cxn modelId="{FE654A1D-AE61-7B44-BA0D-5FBDAAC53D0F}" srcId="{16F69D2B-1D61-044B-B907-2BC496489CA2}" destId="{65E35284-295B-C64C-88E5-B8163F602EF9}" srcOrd="2" destOrd="0" parTransId="{AE1BA247-3926-794A-A6D5-D60EE7B21C27}" sibTransId="{8BB72BF5-8152-8D4D-AF77-D6A4CD93DCC3}"/>
-    <dgm:cxn modelId="{5ABD33AD-F9B3-174A-9BEB-2DA5138FD2C5}" type="presOf" srcId="{8E121E5C-904E-B445-912F-7DD49750F2F9}" destId="{D0FD7599-9CD0-B444-A2FB-F138B112482A}" srcOrd="0" destOrd="1" presId="urn:microsoft.com/office/officeart/2005/8/layout/vList2"/>
-    <dgm:cxn modelId="{263E0935-4E5A-2848-A15A-220653DB801E}" srcId="{635710EA-A60C-164E-8640-52B6C841BC9E}" destId="{16F69D2B-1D61-044B-B907-2BC496489CA2}" srcOrd="1" destOrd="0" parTransId="{7D6C4DB7-78AF-B244-87DE-C8359DD86E19}" sibTransId="{19F9BD0B-86E8-A344-B6F0-49FA00C169C2}"/>
+    <dgm:cxn modelId="{D49B37DF-535E-8847-8C2C-E8757CA3838E}" srcId="{635710EA-A60C-164E-8640-52B6C841BC9E}" destId="{31EF168A-75A2-E448-A575-CFF9572854DB}" srcOrd="0" destOrd="0" parTransId="{0FA76EBC-F30E-BF48-BDDF-285AE21F4E5D}" sibTransId="{B665234A-BF19-684B-8DD4-F37311963C12}"/>
+    <dgm:cxn modelId="{84544EE7-8CB1-AF42-9FBB-691C7DEF80DE}" type="presOf" srcId="{635710EA-A60C-164E-8640-52B6C841BC9E}" destId="{857336E1-C502-164D-B27E-204B55F12B46}" srcOrd="0" destOrd="0" presId="urn:microsoft.com/office/officeart/2005/8/layout/vList2"/>
+    <dgm:cxn modelId="{7498D8CC-800F-EA4E-BCDD-E909A176BB0A}" type="presOf" srcId="{5BA38324-039F-FF46-B3AA-A603FB72246C}" destId="{D0FD7599-9CD0-B444-A2FB-F138B112482A}" srcOrd="0" destOrd="0" presId="urn:microsoft.com/office/officeart/2005/8/layout/vList2"/>
     <dgm:cxn modelId="{E4D4FFB0-1522-7C47-9290-C1EE54978958}" srcId="{16F69D2B-1D61-044B-B907-2BC496489CA2}" destId="{5BA38324-039F-FF46-B3AA-A603FB72246C}" srcOrd="0" destOrd="0" parTransId="{A2F46C4A-2BF0-9F4F-AC10-266B821DE910}" sibTransId="{B794A424-0D01-E646-BB7D-745C7E0913A5}"/>
-    <dgm:cxn modelId="{D49B37DF-535E-8847-8C2C-E8757CA3838E}" srcId="{635710EA-A60C-164E-8640-52B6C841BC9E}" destId="{31EF168A-75A2-E448-A575-CFF9572854DB}" srcOrd="0" destOrd="0" parTransId="{0FA76EBC-F30E-BF48-BDDF-285AE21F4E5D}" sibTransId="{B665234A-BF19-684B-8DD4-F37311963C12}"/>
-    <dgm:cxn modelId="{F47196EF-5B4D-CB44-B08D-39CAA41B1DFD}" type="presOf" srcId="{695F007A-BED9-D040-92EE-6D3D1D9E402A}" destId="{72FBFCEB-0DE1-5049-96FC-8A5D2AF08E2D}" srcOrd="0" destOrd="0" presId="urn:microsoft.com/office/officeart/2005/8/layout/vList2"/>
-    <dgm:cxn modelId="{05750A63-4A3C-9A4D-A3AC-F49DA48EF246}" type="presOf" srcId="{16F69D2B-1D61-044B-B907-2BC496489CA2}" destId="{08767A90-FC64-A640-AB10-F397ACBFCD39}" srcOrd="0" destOrd="0" presId="urn:microsoft.com/office/officeart/2005/8/layout/vList2"/>
-    <dgm:cxn modelId="{CBECD9F6-F133-BB43-9584-9C7DDB9F546E}" srcId="{16F69D2B-1D61-044B-B907-2BC496489CA2}" destId="{77A4A170-B88B-8D44-A48F-8C4010B3DE79}" srcOrd="3" destOrd="0" parTransId="{8F5409DE-5454-5E43-8B6F-E9F8BF989B31}" sibTransId="{12F9B7CD-4D3B-9347-B78E-83D76CB4DC0D}"/>
     <dgm:cxn modelId="{8C1EFD26-6248-934B-B143-5259D0255B7F}" srcId="{31EF168A-75A2-E448-A575-CFF9572854DB}" destId="{695F007A-BED9-D040-92EE-6D3D1D9E402A}" srcOrd="0" destOrd="0" parTransId="{373D84C7-85EB-B349-96AD-F68C63454E64}" sibTransId="{9766473D-5357-0844-B789-47FE6D84D1FB}"/>
     <dgm:cxn modelId="{BCE58D41-ECB0-294E-9134-AC9D8720790A}" type="presParOf" srcId="{857336E1-C502-164D-B27E-204B55F12B46}" destId="{440EE334-38B5-F140-B895-40C7D631FE65}" srcOrd="0" destOrd="0" presId="urn:microsoft.com/office/officeart/2005/8/layout/vList2"/>
     <dgm:cxn modelId="{BD84EAA5-4DD0-0B41-B77C-A5B477A3CABC}" type="presParOf" srcId="{857336E1-C502-164D-B27E-204B55F12B46}" destId="{72FBFCEB-0DE1-5049-96FC-8A5D2AF08E2D}" srcOrd="1" destOrd="0" presId="urn:microsoft.com/office/officeart/2005/8/layout/vList2"/>
@@ -5009,12 +5131,12 @@
         </a:fontRef>
       </dsp:style>
       <dsp:txBody>
-        <a:bodyPr spcFirstLastPara="0" vert="horz" wrap="square" lIns="401565" tIns="66040" rIns="66040" bIns="66040" numCol="1" spcCol="1270" anchor="ctr" anchorCtr="0">
+        <a:bodyPr spcFirstLastPara="0" vert="horz" wrap="square" lIns="401565" tIns="68580" rIns="68580" bIns="68580" numCol="1" spcCol="1270" anchor="ctr" anchorCtr="0">
           <a:noAutofit/>
         </a:bodyPr>
         <a:lstStyle/>
         <a:p>
-          <a:pPr lvl="0" algn="l" defTabSz="1155700">
+          <a:pPr lvl="0" algn="l" defTabSz="1200150">
             <a:lnSpc>
               <a:spcPct val="90000"/>
             </a:lnSpc>
@@ -5026,10 +5148,10 @@
             </a:spcAft>
           </a:pPr>
           <a:r>
-            <a:rPr lang="en-US" sz="2600" kern="1200" dirty="0" smtClean="0"/>
+            <a:rPr lang="en-US" sz="2700" kern="1200" dirty="0" smtClean="0"/>
             <a:t>Homepage polish</a:t>
           </a:r>
-          <a:endParaRPr lang="en-US" sz="2600" kern="1200" dirty="0"/>
+          <a:endParaRPr lang="en-US" sz="2700" kern="1200" dirty="0"/>
         </a:p>
       </dsp:txBody>
       <dsp:txXfrm>
@@ -5051,21 +5173,12 @@
           <a:avLst/>
         </a:prstGeom>
         <a:solidFill>
-          <a:schemeClr val="lt1">
-            <a:hueOff val="0"/>
-            <a:satOff val="0"/>
-            <a:lumOff val="0"/>
-            <a:alphaOff val="0"/>
-          </a:schemeClr>
+          <a:schemeClr val="accent2"/>
         </a:solidFill>
         <a:ln w="19050" cap="flat" cmpd="sng" algn="ctr">
           <a:solidFill>
-            <a:schemeClr val="accent1">
-              <a:alpha val="90000"/>
-              <a:hueOff val="0"/>
-              <a:satOff val="0"/>
-              <a:lumOff val="0"/>
-              <a:alphaOff val="0"/>
+            <a:schemeClr val="accent2">
+              <a:shade val="50000"/>
             </a:schemeClr>
           </a:solidFill>
           <a:prstDash val="solid"/>
@@ -5074,15 +5187,19 @@
       </dsp:spPr>
       <dsp:style>
         <a:lnRef idx="2">
-          <a:scrgbClr r="0" g="0" b="0"/>
+          <a:schemeClr val="accent2">
+            <a:shade val="50000"/>
+          </a:schemeClr>
         </a:lnRef>
         <a:fillRef idx="1">
-          <a:scrgbClr r="0" g="0" b="0"/>
+          <a:schemeClr val="accent2"/>
         </a:fillRef>
         <a:effectRef idx="0">
-          <a:scrgbClr r="0" g="0" b="0"/>
+          <a:schemeClr val="accent2"/>
         </a:effectRef>
-        <a:fontRef idx="minor"/>
+        <a:fontRef idx="minor">
+          <a:schemeClr val="lt1"/>
+        </a:fontRef>
       </dsp:style>
     </dsp:sp>
     <dsp:sp modelId="{2070994C-21DD-4BFF-BEA0-C4234CB2EC77}">
@@ -5135,12 +5252,12 @@
         </a:fontRef>
       </dsp:style>
       <dsp:txBody>
-        <a:bodyPr spcFirstLastPara="0" vert="horz" wrap="square" lIns="401565" tIns="66040" rIns="66040" bIns="66040" numCol="1" spcCol="1270" anchor="ctr" anchorCtr="0">
+        <a:bodyPr spcFirstLastPara="0" vert="horz" wrap="square" lIns="401565" tIns="68580" rIns="68580" bIns="68580" numCol="1" spcCol="1270" anchor="ctr" anchorCtr="0">
           <a:noAutofit/>
         </a:bodyPr>
         <a:lstStyle/>
         <a:p>
-          <a:pPr lvl="0" algn="l" defTabSz="1155700">
+          <a:pPr lvl="0" algn="l" defTabSz="1200150">
             <a:lnSpc>
               <a:spcPct val="90000"/>
             </a:lnSpc>
@@ -5152,10 +5269,10 @@
             </a:spcAft>
           </a:pPr>
           <a:r>
-            <a:rPr lang="en-US" sz="2600" kern="1200" dirty="0" smtClean="0"/>
+            <a:rPr lang="en-US" sz="2700" kern="1200" dirty="0" smtClean="0"/>
             <a:t>Test automation page</a:t>
           </a:r>
-          <a:endParaRPr lang="en-US" sz="2600" kern="1200" dirty="0"/>
+          <a:endParaRPr lang="en-US" sz="2700" kern="1200" dirty="0"/>
         </a:p>
       </dsp:txBody>
       <dsp:txXfrm>
@@ -5177,21 +5294,12 @@
           <a:avLst/>
         </a:prstGeom>
         <a:solidFill>
-          <a:schemeClr val="lt1">
-            <a:hueOff val="0"/>
-            <a:satOff val="0"/>
-            <a:lumOff val="0"/>
-            <a:alphaOff val="0"/>
-          </a:schemeClr>
+          <a:schemeClr val="accent4"/>
         </a:solidFill>
         <a:ln w="19050" cap="flat" cmpd="sng" algn="ctr">
           <a:solidFill>
-            <a:schemeClr val="accent1">
-              <a:alpha val="90000"/>
-              <a:hueOff val="0"/>
-              <a:satOff val="0"/>
-              <a:lumOff val="0"/>
-              <a:alphaOff val="-8000"/>
+            <a:schemeClr val="accent4">
+              <a:shade val="50000"/>
             </a:schemeClr>
           </a:solidFill>
           <a:prstDash val="solid"/>
@@ -5200,15 +5308,19 @@
       </dsp:spPr>
       <dsp:style>
         <a:lnRef idx="2">
-          <a:scrgbClr r="0" g="0" b="0"/>
+          <a:schemeClr val="accent4">
+            <a:shade val="50000"/>
+          </a:schemeClr>
         </a:lnRef>
         <a:fillRef idx="1">
-          <a:scrgbClr r="0" g="0" b="0"/>
+          <a:schemeClr val="accent4"/>
         </a:fillRef>
         <a:effectRef idx="0">
-          <a:scrgbClr r="0" g="0" b="0"/>
+          <a:schemeClr val="accent4"/>
         </a:effectRef>
-        <a:fontRef idx="minor"/>
+        <a:fontRef idx="minor">
+          <a:schemeClr val="lt1"/>
+        </a:fontRef>
       </dsp:style>
     </dsp:sp>
     <dsp:sp modelId="{F0AFD6A4-91B4-4E07-8C90-D690AE028C77}">
@@ -5261,12 +5373,12 @@
         </a:fontRef>
       </dsp:style>
       <dsp:txBody>
-        <a:bodyPr spcFirstLastPara="0" vert="horz" wrap="square" lIns="401565" tIns="66040" rIns="66040" bIns="66040" numCol="1" spcCol="1270" anchor="ctr" anchorCtr="0">
+        <a:bodyPr spcFirstLastPara="0" vert="horz" wrap="square" lIns="401565" tIns="68580" rIns="68580" bIns="68580" numCol="1" spcCol="1270" anchor="ctr" anchorCtr="0">
           <a:noAutofit/>
         </a:bodyPr>
         <a:lstStyle/>
         <a:p>
-          <a:pPr lvl="0" algn="l" defTabSz="1155700">
+          <a:pPr lvl="0" algn="l" defTabSz="1200150">
             <a:lnSpc>
               <a:spcPct val="90000"/>
             </a:lnSpc>
@@ -5278,10 +5390,10 @@
             </a:spcAft>
           </a:pPr>
           <a:r>
-            <a:rPr lang="en-US" sz="2600" kern="1200" dirty="0" smtClean="0"/>
+            <a:rPr lang="en-US" sz="2700" kern="1200" dirty="0" smtClean="0"/>
             <a:t>Contact us integration</a:t>
           </a:r>
-          <a:endParaRPr lang="en-US" sz="2600" kern="1200" dirty="0"/>
+          <a:endParaRPr lang="en-US" sz="2700" kern="1200" dirty="0"/>
         </a:p>
       </dsp:txBody>
       <dsp:txXfrm>
@@ -5303,21 +5415,12 @@
           <a:avLst/>
         </a:prstGeom>
         <a:solidFill>
-          <a:schemeClr val="lt1">
-            <a:hueOff val="0"/>
-            <a:satOff val="0"/>
-            <a:lumOff val="0"/>
-            <a:alphaOff val="0"/>
-          </a:schemeClr>
+          <a:schemeClr val="dk1"/>
         </a:solidFill>
         <a:ln w="19050" cap="flat" cmpd="sng" algn="ctr">
           <a:solidFill>
-            <a:schemeClr val="accent1">
-              <a:alpha val="90000"/>
-              <a:hueOff val="0"/>
-              <a:satOff val="0"/>
-              <a:lumOff val="0"/>
-              <a:alphaOff val="-16000"/>
+            <a:schemeClr val="dk1">
+              <a:shade val="50000"/>
             </a:schemeClr>
           </a:solidFill>
           <a:prstDash val="solid"/>
@@ -5326,15 +5429,19 @@
       </dsp:spPr>
       <dsp:style>
         <a:lnRef idx="2">
-          <a:scrgbClr r="0" g="0" b="0"/>
+          <a:schemeClr val="dk1">
+            <a:shade val="50000"/>
+          </a:schemeClr>
         </a:lnRef>
         <a:fillRef idx="1">
-          <a:scrgbClr r="0" g="0" b="0"/>
+          <a:schemeClr val="dk1"/>
         </a:fillRef>
         <a:effectRef idx="0">
-          <a:scrgbClr r="0" g="0" b="0"/>
+          <a:schemeClr val="dk1"/>
         </a:effectRef>
-        <a:fontRef idx="minor"/>
+        <a:fontRef idx="minor">
+          <a:schemeClr val="lt1"/>
+        </a:fontRef>
       </dsp:style>
     </dsp:sp>
     <dsp:sp modelId="{C3D9FD8C-23AE-40F5-8FE8-12E310EF1414}">
@@ -5387,12 +5494,12 @@
         </a:fontRef>
       </dsp:style>
       <dsp:txBody>
-        <a:bodyPr spcFirstLastPara="0" vert="horz" wrap="square" lIns="401565" tIns="66040" rIns="66040" bIns="66040" numCol="1" spcCol="1270" anchor="ctr" anchorCtr="0">
+        <a:bodyPr spcFirstLastPara="0" vert="horz" wrap="square" lIns="401565" tIns="68580" rIns="68580" bIns="68580" numCol="1" spcCol="1270" anchor="ctr" anchorCtr="0">
           <a:noAutofit/>
         </a:bodyPr>
         <a:lstStyle/>
         <a:p>
-          <a:pPr lvl="0" algn="l" defTabSz="1155700">
+          <a:pPr lvl="0" algn="l" defTabSz="1200150">
             <a:lnSpc>
               <a:spcPct val="90000"/>
             </a:lnSpc>
@@ -5404,10 +5511,10 @@
             </a:spcAft>
           </a:pPr>
           <a:r>
-            <a:rPr lang="en-US" sz="2600" kern="1200" dirty="0" smtClean="0"/>
+            <a:rPr lang="en-US" sz="2700" kern="1200" dirty="0" smtClean="0"/>
             <a:t>Dynamic Team profile</a:t>
           </a:r>
-          <a:endParaRPr lang="en-US" sz="2600" kern="1200" dirty="0"/>
+          <a:endParaRPr lang="en-US" sz="2700" kern="1200" dirty="0"/>
         </a:p>
       </dsp:txBody>
       <dsp:txXfrm>
@@ -5429,21 +5536,12 @@
           <a:avLst/>
         </a:prstGeom>
         <a:solidFill>
-          <a:schemeClr val="lt1">
-            <a:hueOff val="0"/>
-            <a:satOff val="0"/>
-            <a:lumOff val="0"/>
-            <a:alphaOff val="0"/>
-          </a:schemeClr>
+          <a:schemeClr val="accent4"/>
         </a:solidFill>
         <a:ln w="19050" cap="flat" cmpd="sng" algn="ctr">
           <a:solidFill>
-            <a:schemeClr val="accent1">
-              <a:alpha val="90000"/>
-              <a:hueOff val="0"/>
-              <a:satOff val="0"/>
-              <a:lumOff val="0"/>
-              <a:alphaOff val="-24000"/>
+            <a:schemeClr val="accent4">
+              <a:shade val="50000"/>
             </a:schemeClr>
           </a:solidFill>
           <a:prstDash val="solid"/>
@@ -5452,15 +5550,19 @@
       </dsp:spPr>
       <dsp:style>
         <a:lnRef idx="2">
-          <a:scrgbClr r="0" g="0" b="0"/>
+          <a:schemeClr val="accent4">
+            <a:shade val="50000"/>
+          </a:schemeClr>
         </a:lnRef>
         <a:fillRef idx="1">
-          <a:scrgbClr r="0" g="0" b="0"/>
+          <a:schemeClr val="accent4"/>
         </a:fillRef>
         <a:effectRef idx="0">
-          <a:scrgbClr r="0" g="0" b="0"/>
+          <a:schemeClr val="accent4"/>
         </a:effectRef>
-        <a:fontRef idx="minor"/>
+        <a:fontRef idx="minor">
+          <a:schemeClr val="lt1"/>
+        </a:fontRef>
       </dsp:style>
     </dsp:sp>
     <dsp:sp modelId="{E4B9528E-D58E-4A1D-9225-3873A72AD144}">
@@ -5513,12 +5615,12 @@
         </a:fontRef>
       </dsp:style>
       <dsp:txBody>
-        <a:bodyPr spcFirstLastPara="0" vert="horz" wrap="square" lIns="401565" tIns="66040" rIns="66040" bIns="66040" numCol="1" spcCol="1270" anchor="ctr" anchorCtr="0">
+        <a:bodyPr spcFirstLastPara="0" vert="horz" wrap="square" lIns="401565" tIns="68580" rIns="68580" bIns="68580" numCol="1" spcCol="1270" anchor="ctr" anchorCtr="0">
           <a:noAutofit/>
         </a:bodyPr>
         <a:lstStyle/>
         <a:p>
-          <a:pPr lvl="0" algn="l" defTabSz="1155700">
+          <a:pPr lvl="0" algn="l" defTabSz="1200150">
             <a:lnSpc>
               <a:spcPct val="90000"/>
             </a:lnSpc>
@@ -5530,10 +5632,10 @@
             </a:spcAft>
           </a:pPr>
           <a:r>
-            <a:rPr lang="en-US" altLang="zh-CN" sz="2600" kern="1200" dirty="0" smtClean="0"/>
+            <a:rPr lang="en-US" altLang="zh-CN" sz="2700" kern="1200" dirty="0" smtClean="0"/>
             <a:t>New success stories List</a:t>
           </a:r>
-          <a:endParaRPr lang="en-US" sz="2600" kern="1200" dirty="0"/>
+          <a:endParaRPr lang="en-US" sz="2700" kern="1200" dirty="0"/>
         </a:p>
       </dsp:txBody>
       <dsp:txXfrm>
@@ -5555,21 +5657,12 @@
           <a:avLst/>
         </a:prstGeom>
         <a:solidFill>
-          <a:schemeClr val="lt1">
-            <a:hueOff val="0"/>
-            <a:satOff val="0"/>
-            <a:lumOff val="0"/>
-            <a:alphaOff val="0"/>
-          </a:schemeClr>
+          <a:schemeClr val="accent2"/>
         </a:solidFill>
         <a:ln w="19050" cap="flat" cmpd="sng" algn="ctr">
           <a:solidFill>
-            <a:schemeClr val="accent1">
-              <a:alpha val="90000"/>
-              <a:hueOff val="0"/>
-              <a:satOff val="0"/>
-              <a:lumOff val="0"/>
-              <a:alphaOff val="-32000"/>
+            <a:schemeClr val="accent2">
+              <a:shade val="50000"/>
             </a:schemeClr>
           </a:solidFill>
           <a:prstDash val="solid"/>
@@ -5578,15 +5671,19 @@
       </dsp:spPr>
       <dsp:style>
         <a:lnRef idx="2">
-          <a:scrgbClr r="0" g="0" b="0"/>
+          <a:schemeClr val="accent2">
+            <a:shade val="50000"/>
+          </a:schemeClr>
         </a:lnRef>
         <a:fillRef idx="1">
-          <a:scrgbClr r="0" g="0" b="0"/>
+          <a:schemeClr val="accent2"/>
         </a:fillRef>
         <a:effectRef idx="0">
-          <a:scrgbClr r="0" g="0" b="0"/>
+          <a:schemeClr val="accent2"/>
         </a:effectRef>
-        <a:fontRef idx="minor"/>
+        <a:fontRef idx="minor">
+          <a:schemeClr val="lt1"/>
+        </a:fontRef>
       </dsp:style>
     </dsp:sp>
     <dsp:sp modelId="{1D755F7D-E7BF-4228-9932-F5B5AA34D29E}">
@@ -5639,12 +5736,12 @@
         </a:fontRef>
       </dsp:style>
       <dsp:txBody>
-        <a:bodyPr spcFirstLastPara="0" vert="horz" wrap="square" lIns="401565" tIns="66040" rIns="66040" bIns="66040" numCol="1" spcCol="1270" anchor="ctr" anchorCtr="0">
+        <a:bodyPr spcFirstLastPara="0" vert="horz" wrap="square" lIns="401565" tIns="68580" rIns="68580" bIns="68580" numCol="1" spcCol="1270" anchor="ctr" anchorCtr="0">
           <a:noAutofit/>
         </a:bodyPr>
         <a:lstStyle/>
         <a:p>
-          <a:pPr lvl="0" algn="l" defTabSz="1155700">
+          <a:pPr lvl="0" algn="l" defTabSz="1200150">
             <a:lnSpc>
               <a:spcPct val="90000"/>
             </a:lnSpc>
@@ -5656,10 +5753,10 @@
             </a:spcAft>
           </a:pPr>
           <a:r>
-            <a:rPr lang="en-US" sz="2600" kern="1200" dirty="0" smtClean="0"/>
+            <a:rPr lang="en-US" sz="2700" kern="1200" dirty="0" smtClean="0"/>
             <a:t>Research on Google searching strategies</a:t>
           </a:r>
-          <a:endParaRPr lang="en-US" sz="2600" kern="1200" dirty="0"/>
+          <a:endParaRPr lang="en-US" sz="2700" kern="1200" dirty="0"/>
         </a:p>
       </dsp:txBody>
       <dsp:txXfrm>
@@ -5734,7 +5831,7 @@
       </dsp:nvSpPr>
       <dsp:spPr>
         <a:xfrm>
-          <a:off x="0" y="112066"/>
+          <a:off x="0" y="145703"/>
           <a:ext cx="6932613" cy="795483"/>
         </a:xfrm>
         <a:prstGeom prst="roundRect">
@@ -5838,7 +5935,7 @@
         </a:p>
       </dsp:txBody>
       <dsp:txXfrm>
-        <a:off x="38832" y="150898"/>
+        <a:off x="38832" y="184535"/>
         <a:ext cx="6854949" cy="717819"/>
       </dsp:txXfrm>
     </dsp:sp>
@@ -5849,7 +5946,7 @@
       </dsp:nvSpPr>
       <dsp:spPr>
         <a:xfrm>
-          <a:off x="0" y="907549"/>
+          <a:off x="0" y="941186"/>
           <a:ext cx="6932613" cy="1076400"/>
         </a:xfrm>
         <a:prstGeom prst="rect">
@@ -5899,7 +5996,7 @@
         </a:p>
       </dsp:txBody>
       <dsp:txXfrm>
-        <a:off x="0" y="907549"/>
+        <a:off x="0" y="941186"/>
         <a:ext cx="6932613" cy="1076400"/>
       </dsp:txXfrm>
     </dsp:sp>
@@ -5910,7 +6007,7 @@
       </dsp:nvSpPr>
       <dsp:spPr>
         <a:xfrm>
-          <a:off x="0" y="1983949"/>
+          <a:off x="0" y="2017586"/>
           <a:ext cx="6932613" cy="795483"/>
         </a:xfrm>
         <a:prstGeom prst="roundRect">
@@ -6014,7 +6111,7 @@
         </a:p>
       </dsp:txBody>
       <dsp:txXfrm>
-        <a:off x="38832" y="2022781"/>
+        <a:off x="38832" y="2056418"/>
         <a:ext cx="6854949" cy="717819"/>
       </dsp:txXfrm>
     </dsp:sp>
@@ -6025,8 +6122,8 @@
       </dsp:nvSpPr>
       <dsp:spPr>
         <a:xfrm>
-          <a:off x="0" y="2779432"/>
-          <a:ext cx="6932613" cy="1883700"/>
+          <a:off x="0" y="2813069"/>
+          <a:ext cx="6932613" cy="1816425"/>
         </a:xfrm>
         <a:prstGeom prst="rect">
           <a:avLst/>
@@ -6132,8 +6229,8 @@
         </a:p>
       </dsp:txBody>
       <dsp:txXfrm>
-        <a:off x="0" y="2779432"/>
-        <a:ext cx="6932613" cy="1883700"/>
+        <a:off x="0" y="2813069"/>
+        <a:ext cx="6932613" cy="1816425"/>
       </dsp:txXfrm>
     </dsp:sp>
   </dsp:spTree>
@@ -10924,6 +11021,771 @@
 </dgm:styleDef>
 </file>
 
+<file path=ppt/notesMasters/notesMaster1.xml><?xml version="1.0" encoding="utf-8"?>
+<p:notesMaster xmlns:a="http://schemas.openxmlformats.org/drawingml/2006/main" xmlns:r="http://schemas.openxmlformats.org/officeDocument/2006/relationships" xmlns:p="http://schemas.openxmlformats.org/presentationml/2006/main">
+  <p:cSld>
+    <p:bg>
+      <p:bgRef idx="1001">
+        <a:schemeClr val="bg1"/>
+      </p:bgRef>
+    </p:bg>
+    <p:spTree>
+      <p:nvGrpSpPr>
+        <p:cNvPr id="1" name=""/>
+        <p:cNvGrpSpPr/>
+        <p:nvPr/>
+      </p:nvGrpSpPr>
+      <p:grpSpPr>
+        <a:xfrm>
+          <a:off x="0" y="0"/>
+          <a:ext cx="0" cy="0"/>
+          <a:chOff x="0" y="0"/>
+          <a:chExt cx="0" cy="0"/>
+        </a:xfrm>
+      </p:grpSpPr>
+      <p:sp>
+        <p:nvSpPr>
+          <p:cNvPr id="2" name="页眉占位符 1"/>
+          <p:cNvSpPr>
+            <a:spLocks noGrp="1"/>
+          </p:cNvSpPr>
+          <p:nvPr>
+            <p:ph type="hdr" sz="quarter"/>
+          </p:nvPr>
+        </p:nvSpPr>
+        <p:spPr>
+          <a:xfrm>
+            <a:off x="0" y="0"/>
+            <a:ext cx="2971800" cy="458788"/>
+          </a:xfrm>
+          <a:prstGeom prst="rect">
+            <a:avLst/>
+          </a:prstGeom>
+        </p:spPr>
+        <p:txBody>
+          <a:bodyPr vert="horz" lIns="91440" tIns="45720" rIns="91440" bIns="45720" rtlCol="0"/>
+          <a:lstStyle>
+            <a:lvl1pPr algn="l">
+              <a:defRPr sz="1200"/>
+            </a:lvl1pPr>
+          </a:lstStyle>
+          <a:p>
+            <a:endParaRPr lang="en-US"/>
+          </a:p>
+        </p:txBody>
+      </p:sp>
+      <p:sp>
+        <p:nvSpPr>
+          <p:cNvPr id="3" name="日期占位符 2"/>
+          <p:cNvSpPr>
+            <a:spLocks noGrp="1"/>
+          </p:cNvSpPr>
+          <p:nvPr>
+            <p:ph type="dt" idx="1"/>
+          </p:nvPr>
+        </p:nvSpPr>
+        <p:spPr>
+          <a:xfrm>
+            <a:off x="3884613" y="0"/>
+            <a:ext cx="2971800" cy="458788"/>
+          </a:xfrm>
+          <a:prstGeom prst="rect">
+            <a:avLst/>
+          </a:prstGeom>
+        </p:spPr>
+        <p:txBody>
+          <a:bodyPr vert="horz" lIns="91440" tIns="45720" rIns="91440" bIns="45720" rtlCol="0"/>
+          <a:lstStyle>
+            <a:lvl1pPr algn="r">
+              <a:defRPr sz="1200"/>
+            </a:lvl1pPr>
+          </a:lstStyle>
+          <a:p>
+            <a:fld id="{729B9538-45E7-4845-AA35-E1256A21819E}" type="datetimeFigureOut">
+              <a:rPr lang="en-US" smtClean="0"/>
+              <a:t>10/7/2015</a:t>
+            </a:fld>
+            <a:endParaRPr lang="en-US"/>
+          </a:p>
+        </p:txBody>
+      </p:sp>
+      <p:sp>
+        <p:nvSpPr>
+          <p:cNvPr id="4" name="幻灯片图像占位符 3"/>
+          <p:cNvSpPr>
+            <a:spLocks noGrp="1" noRot="1" noChangeAspect="1"/>
+          </p:cNvSpPr>
+          <p:nvPr>
+            <p:ph type="sldImg" idx="2"/>
+          </p:nvPr>
+        </p:nvSpPr>
+        <p:spPr>
+          <a:xfrm>
+            <a:off x="1371600" y="1143000"/>
+            <a:ext cx="4114800" cy="3086100"/>
+          </a:xfrm>
+          <a:prstGeom prst="rect">
+            <a:avLst/>
+          </a:prstGeom>
+          <a:noFill/>
+          <a:ln w="12700">
+            <a:solidFill>
+              <a:prstClr val="black"/>
+            </a:solidFill>
+          </a:ln>
+        </p:spPr>
+        <p:txBody>
+          <a:bodyPr vert="horz" lIns="91440" tIns="45720" rIns="91440" bIns="45720" rtlCol="0" anchor="ctr"/>
+          <a:lstStyle/>
+          <a:p>
+            <a:endParaRPr lang="en-US"/>
+          </a:p>
+        </p:txBody>
+      </p:sp>
+      <p:sp>
+        <p:nvSpPr>
+          <p:cNvPr id="5" name="备注占位符 4"/>
+          <p:cNvSpPr>
+            <a:spLocks noGrp="1"/>
+          </p:cNvSpPr>
+          <p:nvPr>
+            <p:ph type="body" sz="quarter" idx="3"/>
+          </p:nvPr>
+        </p:nvSpPr>
+        <p:spPr>
+          <a:xfrm>
+            <a:off x="685800" y="4400550"/>
+            <a:ext cx="5486400" cy="3600450"/>
+          </a:xfrm>
+          <a:prstGeom prst="rect">
+            <a:avLst/>
+          </a:prstGeom>
+        </p:spPr>
+        <p:txBody>
+          <a:bodyPr vert="horz" lIns="91440" tIns="45720" rIns="91440" bIns="45720" rtlCol="0"/>
+          <a:lstStyle/>
+          <a:p>
+            <a:pPr lvl="0"/>
+            <a:r>
+              <a:rPr lang="zh-CN" altLang="en-US" smtClean="0"/>
+              <a:t>单击此处编辑母版文本样式</a:t>
+            </a:r>
+          </a:p>
+          <a:p>
+            <a:pPr lvl="1"/>
+            <a:r>
+              <a:rPr lang="zh-CN" altLang="en-US" smtClean="0"/>
+              <a:t>第二级</a:t>
+            </a:r>
+          </a:p>
+          <a:p>
+            <a:pPr lvl="2"/>
+            <a:r>
+              <a:rPr lang="zh-CN" altLang="en-US" smtClean="0"/>
+              <a:t>第三级</a:t>
+            </a:r>
+          </a:p>
+          <a:p>
+            <a:pPr lvl="3"/>
+            <a:r>
+              <a:rPr lang="zh-CN" altLang="en-US" smtClean="0"/>
+              <a:t>第四级</a:t>
+            </a:r>
+          </a:p>
+          <a:p>
+            <a:pPr lvl="4"/>
+            <a:r>
+              <a:rPr lang="zh-CN" altLang="en-US" smtClean="0"/>
+              <a:t>第五级</a:t>
+            </a:r>
+            <a:endParaRPr lang="en-US"/>
+          </a:p>
+        </p:txBody>
+      </p:sp>
+      <p:sp>
+        <p:nvSpPr>
+          <p:cNvPr id="6" name="页脚占位符 5"/>
+          <p:cNvSpPr>
+            <a:spLocks noGrp="1"/>
+          </p:cNvSpPr>
+          <p:nvPr>
+            <p:ph type="ftr" sz="quarter" idx="4"/>
+          </p:nvPr>
+        </p:nvSpPr>
+        <p:spPr>
+          <a:xfrm>
+            <a:off x="0" y="8685213"/>
+            <a:ext cx="2971800" cy="458787"/>
+          </a:xfrm>
+          <a:prstGeom prst="rect">
+            <a:avLst/>
+          </a:prstGeom>
+        </p:spPr>
+        <p:txBody>
+          <a:bodyPr vert="horz" lIns="91440" tIns="45720" rIns="91440" bIns="45720" rtlCol="0" anchor="b"/>
+          <a:lstStyle>
+            <a:lvl1pPr algn="l">
+              <a:defRPr sz="1200"/>
+            </a:lvl1pPr>
+          </a:lstStyle>
+          <a:p>
+            <a:endParaRPr lang="en-US"/>
+          </a:p>
+        </p:txBody>
+      </p:sp>
+      <p:sp>
+        <p:nvSpPr>
+          <p:cNvPr id="7" name="灯片编号占位符 6"/>
+          <p:cNvSpPr>
+            <a:spLocks noGrp="1"/>
+          </p:cNvSpPr>
+          <p:nvPr>
+            <p:ph type="sldNum" sz="quarter" idx="5"/>
+          </p:nvPr>
+        </p:nvSpPr>
+        <p:spPr>
+          <a:xfrm>
+            <a:off x="3884613" y="8685213"/>
+            <a:ext cx="2971800" cy="458787"/>
+          </a:xfrm>
+          <a:prstGeom prst="rect">
+            <a:avLst/>
+          </a:prstGeom>
+        </p:spPr>
+        <p:txBody>
+          <a:bodyPr vert="horz" lIns="91440" tIns="45720" rIns="91440" bIns="45720" rtlCol="0" anchor="b"/>
+          <a:lstStyle>
+            <a:lvl1pPr algn="r">
+              <a:defRPr sz="1200"/>
+            </a:lvl1pPr>
+          </a:lstStyle>
+          <a:p>
+            <a:fld id="{0B9AD98F-03BE-4B43-ABEF-4A497F7ABA21}" type="slidenum">
+              <a:rPr lang="en-US" smtClean="0"/>
+              <a:t>‹#›</a:t>
+            </a:fld>
+            <a:endParaRPr lang="en-US"/>
+          </a:p>
+        </p:txBody>
+      </p:sp>
+    </p:spTree>
+    <p:extLst>
+      <p:ext uri="{BB962C8B-B14F-4D97-AF65-F5344CB8AC3E}">
+        <p14:creationId xmlns:p14="http://schemas.microsoft.com/office/powerpoint/2010/main" val="3323048095"/>
+      </p:ext>
+    </p:extLst>
+  </p:cSld>
+  <p:clrMap bg1="lt1" tx1="dk1" bg2="lt2" tx2="dk2" accent1="accent1" accent2="accent2" accent3="accent3" accent4="accent4" accent5="accent5" accent6="accent6" hlink="hlink" folHlink="folHlink"/>
+  <p:notesStyle>
+    <a:lvl1pPr marL="0" algn="l" defTabSz="914400" rtl="0" eaLnBrk="1" latinLnBrk="0" hangingPunct="1">
+      <a:defRPr sz="1200" kern="1200">
+        <a:solidFill>
+          <a:schemeClr val="tx1"/>
+        </a:solidFill>
+        <a:latin typeface="+mn-lt"/>
+        <a:ea typeface="+mn-ea"/>
+        <a:cs typeface="+mn-cs"/>
+      </a:defRPr>
+    </a:lvl1pPr>
+    <a:lvl2pPr marL="457200" algn="l" defTabSz="914400" rtl="0" eaLnBrk="1" latinLnBrk="0" hangingPunct="1">
+      <a:defRPr sz="1200" kern="1200">
+        <a:solidFill>
+          <a:schemeClr val="tx1"/>
+        </a:solidFill>
+        <a:latin typeface="+mn-lt"/>
+        <a:ea typeface="+mn-ea"/>
+        <a:cs typeface="+mn-cs"/>
+      </a:defRPr>
+    </a:lvl2pPr>
+    <a:lvl3pPr marL="914400" algn="l" defTabSz="914400" rtl="0" eaLnBrk="1" latinLnBrk="0" hangingPunct="1">
+      <a:defRPr sz="1200" kern="1200">
+        <a:solidFill>
+          <a:schemeClr val="tx1"/>
+        </a:solidFill>
+        <a:latin typeface="+mn-lt"/>
+        <a:ea typeface="+mn-ea"/>
+        <a:cs typeface="+mn-cs"/>
+      </a:defRPr>
+    </a:lvl3pPr>
+    <a:lvl4pPr marL="1371600" algn="l" defTabSz="914400" rtl="0" eaLnBrk="1" latinLnBrk="0" hangingPunct="1">
+      <a:defRPr sz="1200" kern="1200">
+        <a:solidFill>
+          <a:schemeClr val="tx1"/>
+        </a:solidFill>
+        <a:latin typeface="+mn-lt"/>
+        <a:ea typeface="+mn-ea"/>
+        <a:cs typeface="+mn-cs"/>
+      </a:defRPr>
+    </a:lvl4pPr>
+    <a:lvl5pPr marL="1828800" algn="l" defTabSz="914400" rtl="0" eaLnBrk="1" latinLnBrk="0" hangingPunct="1">
+      <a:defRPr sz="1200" kern="1200">
+        <a:solidFill>
+          <a:schemeClr val="tx1"/>
+        </a:solidFill>
+        <a:latin typeface="+mn-lt"/>
+        <a:ea typeface="+mn-ea"/>
+        <a:cs typeface="+mn-cs"/>
+      </a:defRPr>
+    </a:lvl5pPr>
+    <a:lvl6pPr marL="2286000" algn="l" defTabSz="914400" rtl="0" eaLnBrk="1" latinLnBrk="0" hangingPunct="1">
+      <a:defRPr sz="1200" kern="1200">
+        <a:solidFill>
+          <a:schemeClr val="tx1"/>
+        </a:solidFill>
+        <a:latin typeface="+mn-lt"/>
+        <a:ea typeface="+mn-ea"/>
+        <a:cs typeface="+mn-cs"/>
+      </a:defRPr>
+    </a:lvl6pPr>
+    <a:lvl7pPr marL="2743200" algn="l" defTabSz="914400" rtl="0" eaLnBrk="1" latinLnBrk="0" hangingPunct="1">
+      <a:defRPr sz="1200" kern="1200">
+        <a:solidFill>
+          <a:schemeClr val="tx1"/>
+        </a:solidFill>
+        <a:latin typeface="+mn-lt"/>
+        <a:ea typeface="+mn-ea"/>
+        <a:cs typeface="+mn-cs"/>
+      </a:defRPr>
+    </a:lvl7pPr>
+    <a:lvl8pPr marL="3200400" algn="l" defTabSz="914400" rtl="0" eaLnBrk="1" latinLnBrk="0" hangingPunct="1">
+      <a:defRPr sz="1200" kern="1200">
+        <a:solidFill>
+          <a:schemeClr val="tx1"/>
+        </a:solidFill>
+        <a:latin typeface="+mn-lt"/>
+        <a:ea typeface="+mn-ea"/>
+        <a:cs typeface="+mn-cs"/>
+      </a:defRPr>
+    </a:lvl8pPr>
+    <a:lvl9pPr marL="3657600" algn="l" defTabSz="914400" rtl="0" eaLnBrk="1" latinLnBrk="0" hangingPunct="1">
+      <a:defRPr sz="1200" kern="1200">
+        <a:solidFill>
+          <a:schemeClr val="tx1"/>
+        </a:solidFill>
+        <a:latin typeface="+mn-lt"/>
+        <a:ea typeface="+mn-ea"/>
+        <a:cs typeface="+mn-cs"/>
+      </a:defRPr>
+    </a:lvl9pPr>
+  </p:notesStyle>
+</p:notesMaster>
+</file>
+
+<file path=ppt/notesSlides/notesSlide1.xml><?xml version="1.0" encoding="utf-8"?>
+<p:notes xmlns:a="http://schemas.openxmlformats.org/drawingml/2006/main" xmlns:r="http://schemas.openxmlformats.org/officeDocument/2006/relationships" xmlns:p="http://schemas.openxmlformats.org/presentationml/2006/main">
+  <p:cSld>
+    <p:spTree>
+      <p:nvGrpSpPr>
+        <p:cNvPr id="1" name=""/>
+        <p:cNvGrpSpPr/>
+        <p:nvPr/>
+      </p:nvGrpSpPr>
+      <p:grpSpPr>
+        <a:xfrm>
+          <a:off x="0" y="0"/>
+          <a:ext cx="0" cy="0"/>
+          <a:chOff x="0" y="0"/>
+          <a:chExt cx="0" cy="0"/>
+        </a:xfrm>
+      </p:grpSpPr>
+      <p:sp>
+        <p:nvSpPr>
+          <p:cNvPr id="2" name="幻灯片图像占位符 1"/>
+          <p:cNvSpPr>
+            <a:spLocks noGrp="1" noRot="1" noChangeAspect="1"/>
+          </p:cNvSpPr>
+          <p:nvPr>
+            <p:ph type="sldImg"/>
+          </p:nvPr>
+        </p:nvSpPr>
+        <p:spPr/>
+      </p:sp>
+      <p:sp>
+        <p:nvSpPr>
+          <p:cNvPr id="3" name="备注占位符 2"/>
+          <p:cNvSpPr>
+            <a:spLocks noGrp="1"/>
+          </p:cNvSpPr>
+          <p:nvPr>
+            <p:ph type="body" idx="1"/>
+          </p:nvPr>
+        </p:nvSpPr>
+        <p:spPr/>
+        <p:txBody>
+          <a:bodyPr/>
+          <a:lstStyle/>
+          <a:p>
+            <a:r>
+              <a:rPr lang="en-US" altLang="zh-CN" dirty="0" smtClean="0"/>
+              <a:t>Good afternoon everyone, we are the VEL team.</a:t>
+            </a:r>
+            <a:r>
+              <a:rPr lang="en-US" altLang="zh-CN" baseline="0" dirty="0" smtClean="0"/>
+              <a:t> I am Shawn, who is the scrum master in this week.</a:t>
+            </a:r>
+          </a:p>
+          <a:p>
+            <a:r>
+              <a:rPr lang="en-US" baseline="0" dirty="0" smtClean="0"/>
+              <a:t>Our project is to re-develop a currently existing online education employment website for </a:t>
+            </a:r>
+            <a:r>
+              <a:rPr lang="en-US" baseline="0" dirty="0" err="1" smtClean="0"/>
+              <a:t>Getskills</a:t>
+            </a:r>
+            <a:r>
+              <a:rPr lang="en-US" baseline="0" dirty="0" smtClean="0"/>
+              <a:t> company. </a:t>
+            </a:r>
+          </a:p>
+          <a:p>
+            <a:r>
+              <a:rPr lang="en-US" baseline="0" dirty="0" smtClean="0"/>
+              <a:t>Initially, there is a little trouble because the platform is changed from Android to website, where the team has very limited experience.</a:t>
+            </a:r>
+            <a:endParaRPr lang="en-US" dirty="0"/>
+          </a:p>
+        </p:txBody>
+      </p:sp>
+      <p:sp>
+        <p:nvSpPr>
+          <p:cNvPr id="4" name="灯片编号占位符 3"/>
+          <p:cNvSpPr>
+            <a:spLocks noGrp="1"/>
+          </p:cNvSpPr>
+          <p:nvPr>
+            <p:ph type="sldNum" sz="quarter" idx="10"/>
+          </p:nvPr>
+        </p:nvSpPr>
+        <p:spPr/>
+        <p:txBody>
+          <a:bodyPr/>
+          <a:lstStyle/>
+          <a:p>
+            <a:fld id="{0B9AD98F-03BE-4B43-ABEF-4A497F7ABA21}" type="slidenum">
+              <a:rPr lang="en-US" smtClean="0"/>
+              <a:t>1</a:t>
+            </a:fld>
+            <a:endParaRPr lang="en-US"/>
+          </a:p>
+        </p:txBody>
+      </p:sp>
+    </p:spTree>
+    <p:extLst>
+      <p:ext uri="{BB962C8B-B14F-4D97-AF65-F5344CB8AC3E}">
+        <p14:creationId xmlns:p14="http://schemas.microsoft.com/office/powerpoint/2010/main" val="1296375847"/>
+      </p:ext>
+    </p:extLst>
+  </p:cSld>
+  <p:clrMapOvr>
+    <a:masterClrMapping/>
+  </p:clrMapOvr>
+</p:notes>
+</file>
+
+<file path=ppt/notesSlides/notesSlide2.xml><?xml version="1.0" encoding="utf-8"?>
+<p:notes xmlns:a="http://schemas.openxmlformats.org/drawingml/2006/main" xmlns:r="http://schemas.openxmlformats.org/officeDocument/2006/relationships" xmlns:p="http://schemas.openxmlformats.org/presentationml/2006/main">
+  <p:cSld>
+    <p:spTree>
+      <p:nvGrpSpPr>
+        <p:cNvPr id="1" name=""/>
+        <p:cNvGrpSpPr/>
+        <p:nvPr/>
+      </p:nvGrpSpPr>
+      <p:grpSpPr>
+        <a:xfrm>
+          <a:off x="0" y="0"/>
+          <a:ext cx="0" cy="0"/>
+          <a:chOff x="0" y="0"/>
+          <a:chExt cx="0" cy="0"/>
+        </a:xfrm>
+      </p:grpSpPr>
+      <p:sp>
+        <p:nvSpPr>
+          <p:cNvPr id="2" name="幻灯片图像占位符 1"/>
+          <p:cNvSpPr>
+            <a:spLocks noGrp="1" noRot="1" noChangeAspect="1"/>
+          </p:cNvSpPr>
+          <p:nvPr>
+            <p:ph type="sldImg"/>
+          </p:nvPr>
+        </p:nvSpPr>
+        <p:spPr/>
+      </p:sp>
+      <p:sp>
+        <p:nvSpPr>
+          <p:cNvPr id="3" name="备注占位符 2"/>
+          <p:cNvSpPr>
+            <a:spLocks noGrp="1"/>
+          </p:cNvSpPr>
+          <p:nvPr>
+            <p:ph type="body" idx="1"/>
+          </p:nvPr>
+        </p:nvSpPr>
+        <p:spPr/>
+        <p:txBody>
+          <a:bodyPr/>
+          <a:lstStyle/>
+          <a:p>
+            <a:r>
+              <a:rPr lang="en-US" dirty="0" smtClean="0"/>
+              <a:t>However</a:t>
+            </a:r>
+            <a:r>
+              <a:rPr lang="en-US" baseline="0" dirty="0" smtClean="0"/>
+              <a:t>, it doesn't matter since we apply agile and lean.</a:t>
+            </a:r>
+          </a:p>
+          <a:p>
+            <a:r>
+              <a:rPr lang="en-US" baseline="0" dirty="0" smtClean="0"/>
+              <a:t>Our team learned required technology quickly and made a detail development plan.</a:t>
+            </a:r>
+          </a:p>
+          <a:p>
+            <a:r>
+              <a:rPr lang="en-US" baseline="0" dirty="0" smtClean="0"/>
+              <a:t>Now we are in the last stage and everything goes well.</a:t>
+            </a:r>
+            <a:endParaRPr lang="en-US" dirty="0"/>
+          </a:p>
+        </p:txBody>
+      </p:sp>
+      <p:sp>
+        <p:nvSpPr>
+          <p:cNvPr id="4" name="灯片编号占位符 3"/>
+          <p:cNvSpPr>
+            <a:spLocks noGrp="1"/>
+          </p:cNvSpPr>
+          <p:nvPr>
+            <p:ph type="sldNum" sz="quarter" idx="10"/>
+          </p:nvPr>
+        </p:nvSpPr>
+        <p:spPr/>
+        <p:txBody>
+          <a:bodyPr/>
+          <a:lstStyle/>
+          <a:p>
+            <a:fld id="{0B9AD98F-03BE-4B43-ABEF-4A497F7ABA21}" type="slidenum">
+              <a:rPr lang="en-US" smtClean="0"/>
+              <a:t>2</a:t>
+            </a:fld>
+            <a:endParaRPr lang="en-US"/>
+          </a:p>
+        </p:txBody>
+      </p:sp>
+    </p:spTree>
+    <p:extLst>
+      <p:ext uri="{BB962C8B-B14F-4D97-AF65-F5344CB8AC3E}">
+        <p14:creationId xmlns:p14="http://schemas.microsoft.com/office/powerpoint/2010/main" val="1267830691"/>
+      </p:ext>
+    </p:extLst>
+  </p:cSld>
+  <p:clrMapOvr>
+    <a:masterClrMapping/>
+  </p:clrMapOvr>
+</p:notes>
+</file>
+
+<file path=ppt/notesSlides/notesSlide3.xml><?xml version="1.0" encoding="utf-8"?>
+<p:notes xmlns:a="http://schemas.openxmlformats.org/drawingml/2006/main" xmlns:r="http://schemas.openxmlformats.org/officeDocument/2006/relationships" xmlns:p="http://schemas.openxmlformats.org/presentationml/2006/main">
+  <p:cSld>
+    <p:spTree>
+      <p:nvGrpSpPr>
+        <p:cNvPr id="1" name=""/>
+        <p:cNvGrpSpPr/>
+        <p:nvPr/>
+      </p:nvGrpSpPr>
+      <p:grpSpPr>
+        <a:xfrm>
+          <a:off x="0" y="0"/>
+          <a:ext cx="0" cy="0"/>
+          <a:chOff x="0" y="0"/>
+          <a:chExt cx="0" cy="0"/>
+        </a:xfrm>
+      </p:grpSpPr>
+      <p:sp>
+        <p:nvSpPr>
+          <p:cNvPr id="2" name="幻灯片图像占位符 1"/>
+          <p:cNvSpPr>
+            <a:spLocks noGrp="1" noRot="1" noChangeAspect="1"/>
+          </p:cNvSpPr>
+          <p:nvPr>
+            <p:ph type="sldImg"/>
+          </p:nvPr>
+        </p:nvSpPr>
+        <p:spPr/>
+      </p:sp>
+      <p:sp>
+        <p:nvSpPr>
+          <p:cNvPr id="3" name="备注占位符 2"/>
+          <p:cNvSpPr>
+            <a:spLocks noGrp="1"/>
+          </p:cNvSpPr>
+          <p:nvPr>
+            <p:ph type="body" idx="1"/>
+          </p:nvPr>
+        </p:nvSpPr>
+        <p:spPr/>
+        <p:txBody>
+          <a:bodyPr/>
+          <a:lstStyle/>
+          <a:p>
+            <a:r>
+              <a:rPr lang="en-US" dirty="0" smtClean="0"/>
+              <a:t>Do you remember</a:t>
+            </a:r>
+            <a:r>
+              <a:rPr lang="en-US" baseline="0" dirty="0" smtClean="0"/>
+              <a:t> that in the prototype presentation we proudly stated that all the user stories in the initial product backlog have been completely finished and our customers are pretty satisfied.</a:t>
+            </a:r>
+          </a:p>
+          <a:p>
+            <a:endParaRPr lang="en-US" baseline="0" dirty="0" smtClean="0"/>
+          </a:p>
+          <a:p>
+            <a:r>
+              <a:rPr lang="en-US" baseline="0" dirty="0" smtClean="0"/>
+              <a:t>Therefore, the main goal in the second sprint is to refine our product based on the feedbacks we got. We expanded the product backlog and achieved all the user stories, again.</a:t>
+            </a:r>
+            <a:endParaRPr lang="en-US" dirty="0"/>
+          </a:p>
+        </p:txBody>
+      </p:sp>
+      <p:sp>
+        <p:nvSpPr>
+          <p:cNvPr id="4" name="灯片编号占位符 3"/>
+          <p:cNvSpPr>
+            <a:spLocks noGrp="1"/>
+          </p:cNvSpPr>
+          <p:nvPr>
+            <p:ph type="sldNum" sz="quarter" idx="10"/>
+          </p:nvPr>
+        </p:nvSpPr>
+        <p:spPr/>
+        <p:txBody>
+          <a:bodyPr/>
+          <a:lstStyle/>
+          <a:p>
+            <a:fld id="{0B9AD98F-03BE-4B43-ABEF-4A497F7ABA21}" type="slidenum">
+              <a:rPr lang="en-US" smtClean="0"/>
+              <a:t>3</a:t>
+            </a:fld>
+            <a:endParaRPr lang="en-US"/>
+          </a:p>
+        </p:txBody>
+      </p:sp>
+    </p:spTree>
+    <p:extLst>
+      <p:ext uri="{BB962C8B-B14F-4D97-AF65-F5344CB8AC3E}">
+        <p14:creationId xmlns:p14="http://schemas.microsoft.com/office/powerpoint/2010/main" val="840001143"/>
+      </p:ext>
+    </p:extLst>
+  </p:cSld>
+  <p:clrMapOvr>
+    <a:masterClrMapping/>
+  </p:clrMapOvr>
+</p:notes>
+</file>
+
+<file path=ppt/notesSlides/notesSlide4.xml><?xml version="1.0" encoding="utf-8"?>
+<p:notes xmlns:a="http://schemas.openxmlformats.org/drawingml/2006/main" xmlns:r="http://schemas.openxmlformats.org/officeDocument/2006/relationships" xmlns:p="http://schemas.openxmlformats.org/presentationml/2006/main">
+  <p:cSld>
+    <p:spTree>
+      <p:nvGrpSpPr>
+        <p:cNvPr id="1" name=""/>
+        <p:cNvGrpSpPr/>
+        <p:nvPr/>
+      </p:nvGrpSpPr>
+      <p:grpSpPr>
+        <a:xfrm>
+          <a:off x="0" y="0"/>
+          <a:ext cx="0" cy="0"/>
+          <a:chOff x="0" y="0"/>
+          <a:chExt cx="0" cy="0"/>
+        </a:xfrm>
+      </p:grpSpPr>
+      <p:sp>
+        <p:nvSpPr>
+          <p:cNvPr id="2" name="幻灯片图像占位符 1"/>
+          <p:cNvSpPr>
+            <a:spLocks noGrp="1" noRot="1" noChangeAspect="1"/>
+          </p:cNvSpPr>
+          <p:nvPr>
+            <p:ph type="sldImg"/>
+          </p:nvPr>
+        </p:nvSpPr>
+        <p:spPr/>
+      </p:sp>
+      <p:sp>
+        <p:nvSpPr>
+          <p:cNvPr id="3" name="备注占位符 2"/>
+          <p:cNvSpPr>
+            <a:spLocks noGrp="1"/>
+          </p:cNvSpPr>
+          <p:nvPr>
+            <p:ph type="body" idx="1"/>
+          </p:nvPr>
+        </p:nvSpPr>
+        <p:spPr/>
+        <p:txBody>
+          <a:bodyPr/>
+          <a:lstStyle/>
+          <a:p>
+            <a:r>
+              <a:rPr lang="en-US" dirty="0" smtClean="0"/>
+              <a:t>Let me list these</a:t>
+            </a:r>
+            <a:r>
+              <a:rPr lang="en-US" baseline="0" dirty="0" smtClean="0"/>
+              <a:t> user stories in sprint 2</a:t>
+            </a:r>
+          </a:p>
+          <a:p>
+            <a:r>
+              <a:rPr lang="en-US" baseline="0" dirty="0" smtClean="0"/>
+              <a:t>As you see, totally there are 6 user stories. The purple mark means this item is a refinement task; the yellow mark implies it is new added page or function; the black mark means it is an integration task with the Legacy system; and the last white one, which I think it is the most interesting part, it is to provide some strategies to make the website stand out from google searching because it is a real project. We also write a report about this.</a:t>
+            </a:r>
+            <a:endParaRPr lang="en-US" dirty="0"/>
+          </a:p>
+        </p:txBody>
+      </p:sp>
+      <p:sp>
+        <p:nvSpPr>
+          <p:cNvPr id="4" name="灯片编号占位符 3"/>
+          <p:cNvSpPr>
+            <a:spLocks noGrp="1"/>
+          </p:cNvSpPr>
+          <p:nvPr>
+            <p:ph type="sldNum" sz="quarter" idx="10"/>
+          </p:nvPr>
+        </p:nvSpPr>
+        <p:spPr/>
+        <p:txBody>
+          <a:bodyPr/>
+          <a:lstStyle/>
+          <a:p>
+            <a:fld id="{0B9AD98F-03BE-4B43-ABEF-4A497F7ABA21}" type="slidenum">
+              <a:rPr lang="en-US" smtClean="0"/>
+              <a:t>4</a:t>
+            </a:fld>
+            <a:endParaRPr lang="en-US"/>
+          </a:p>
+        </p:txBody>
+      </p:sp>
+    </p:spTree>
+    <p:extLst>
+      <p:ext uri="{BB962C8B-B14F-4D97-AF65-F5344CB8AC3E}">
+        <p14:creationId xmlns:p14="http://schemas.microsoft.com/office/powerpoint/2010/main" val="3962142907"/>
+      </p:ext>
+    </p:extLst>
+  </p:cSld>
+  <p:clrMapOvr>
+    <a:masterClrMapping/>
+  </p:clrMapOvr>
+</p:notes>
+</file>
+
 <file path=ppt/slideLayouts/slideLayout1.xml><?xml version="1.0" encoding="utf-8"?>
 <p:sldLayout xmlns:a="http://schemas.openxmlformats.org/drawingml/2006/main" xmlns:r="http://schemas.openxmlformats.org/officeDocument/2006/relationships" xmlns:p="http://schemas.openxmlformats.org/presentationml/2006/main" type="title" preserve="1">
   <p:cSld name="Title Slide">
@@ -11145,7 +12007,7 @@
           <a:p>
             <a:fld id="{ED2281E1-4B7B-814B-A555-77F82E1F53A0}" type="datetimeFigureOut">
               <a:rPr lang="en-US" smtClean="0"/>
-              <a:t>6/10/15</a:t>
+              <a:t>10/7/2015</a:t>
             </a:fld>
             <a:endParaRPr lang="en-US"/>
           </a:p>
@@ -11477,7 +12339,7 @@
           <a:p>
             <a:fld id="{ED2281E1-4B7B-814B-A555-77F82E1F53A0}" type="datetimeFigureOut">
               <a:rPr lang="en-US" smtClean="0"/>
-              <a:t>6/10/15</a:t>
+              <a:t>10/7/2015</a:t>
             </a:fld>
             <a:endParaRPr lang="en-US"/>
           </a:p>
@@ -11809,7 +12671,7 @@
           <a:p>
             <a:fld id="{ED2281E1-4B7B-814B-A555-77F82E1F53A0}" type="datetimeFigureOut">
               <a:rPr lang="en-US" smtClean="0"/>
-              <a:t>6/10/15</a:t>
+              <a:t>10/7/2015</a:t>
             </a:fld>
             <a:endParaRPr lang="en-US"/>
           </a:p>
@@ -12141,7 +13003,7 @@
           <a:p>
             <a:fld id="{ED2281E1-4B7B-814B-A555-77F82E1F53A0}" type="datetimeFigureOut">
               <a:rPr lang="en-US" smtClean="0"/>
-              <a:t>6/10/15</a:t>
+              <a:t>10/7/2015</a:t>
             </a:fld>
             <a:endParaRPr lang="en-US"/>
           </a:p>
@@ -12830,7 +13692,7 @@
           <a:p>
             <a:fld id="{ED2281E1-4B7B-814B-A555-77F82E1F53A0}" type="datetimeFigureOut">
               <a:rPr lang="en-US" smtClean="0"/>
-              <a:t>6/10/15</a:t>
+              <a:t>10/7/2015</a:t>
             </a:fld>
             <a:endParaRPr lang="en-US"/>
           </a:p>
@@ -13009,7 +13871,7 @@
           <a:p>
             <a:fld id="{ED2281E1-4B7B-814B-A555-77F82E1F53A0}" type="datetimeFigureOut">
               <a:rPr lang="en-US" smtClean="0"/>
-              <a:t>6/10/15</a:t>
+              <a:t>10/7/2015</a:t>
             </a:fld>
             <a:endParaRPr lang="en-US"/>
           </a:p>
@@ -13234,7 +14096,7 @@
   <p:clrMapOvr>
     <a:masterClrMapping/>
   </p:clrMapOvr>
-  <p:transition xmlns:p14="http://schemas.microsoft.com/office/powerpoint/2010/main" spd="med"/>
+  <p:transition spd="med"/>
 </p:sldLayout>
 </file>
 
@@ -13302,7 +14164,7 @@
   <p:clrMapOvr>
     <a:masterClrMapping/>
   </p:clrMapOvr>
-  <p:transition xmlns:p14="http://schemas.microsoft.com/office/powerpoint/2010/main" spd="med"/>
+  <p:transition spd="med"/>
 </p:sldLayout>
 </file>
 
@@ -13424,7 +14286,7 @@
           <a:p>
             <a:fld id="{ED2281E1-4B7B-814B-A555-77F82E1F53A0}" type="datetimeFigureOut">
               <a:rPr lang="en-US" smtClean="0"/>
-              <a:t>6/10/15</a:t>
+              <a:t>10/7/2015</a:t>
             </a:fld>
             <a:endParaRPr lang="en-US"/>
           </a:p>
@@ -13672,7 +14534,7 @@
           <a:p>
             <a:fld id="{ED2281E1-4B7B-814B-A555-77F82E1F53A0}" type="datetimeFigureOut">
               <a:rPr lang="en-US" smtClean="0"/>
-              <a:t>6/10/15</a:t>
+              <a:t>10/7/2015</a:t>
             </a:fld>
             <a:endParaRPr lang="en-US"/>
           </a:p>
@@ -14002,7 +14864,7 @@
           <a:p>
             <a:fld id="{ED2281E1-4B7B-814B-A555-77F82E1F53A0}" type="datetimeFigureOut">
               <a:rPr lang="en-US" smtClean="0"/>
-              <a:t>6/10/15</a:t>
+              <a:t>10/7/2015</a:t>
             </a:fld>
             <a:endParaRPr lang="en-US"/>
           </a:p>
@@ -14294,7 +15156,7 @@
           <a:p>
             <a:fld id="{ED2281E1-4B7B-814B-A555-77F82E1F53A0}" type="datetimeFigureOut">
               <a:rPr lang="en-US" smtClean="0"/>
-              <a:t>6/10/15</a:t>
+              <a:t>10/7/2015</a:t>
             </a:fld>
             <a:endParaRPr lang="en-US"/>
           </a:p>
@@ -14730,7 +15592,7 @@
           <a:p>
             <a:fld id="{ED2281E1-4B7B-814B-A555-77F82E1F53A0}" type="datetimeFigureOut">
               <a:rPr lang="en-US" smtClean="0"/>
-              <a:t>6/10/15</a:t>
+              <a:t>10/7/2015</a:t>
             </a:fld>
             <a:endParaRPr lang="en-US"/>
           </a:p>
@@ -14917,7 +15779,7 @@
           <a:p>
             <a:fld id="{ED2281E1-4B7B-814B-A555-77F82E1F53A0}" type="datetimeFigureOut">
               <a:rPr lang="en-US" smtClean="0"/>
-              <a:t>6/10/15</a:t>
+              <a:t>10/7/2015</a:t>
             </a:fld>
             <a:endParaRPr lang="en-US"/>
           </a:p>
@@ -15007,7 +15869,7 @@
           <a:p>
             <a:fld id="{ED2281E1-4B7B-814B-A555-77F82E1F53A0}" type="datetimeFigureOut">
               <a:rPr lang="en-US" smtClean="0"/>
-              <a:t>6/10/15</a:t>
+              <a:t>10/7/2015</a:t>
             </a:fld>
             <a:endParaRPr lang="en-US"/>
           </a:p>
@@ -15288,7 +16150,7 @@
           <a:p>
             <a:fld id="{ED2281E1-4B7B-814B-A555-77F82E1F53A0}" type="datetimeFigureOut">
               <a:rPr lang="en-US" smtClean="0"/>
-              <a:t>6/10/15</a:t>
+              <a:t>10/7/2015</a:t>
             </a:fld>
             <a:endParaRPr lang="en-US"/>
           </a:p>
@@ -15503,7 +16365,7 @@
           <a:p>
             <a:fld id="{ED2281E1-4B7B-814B-A555-77F82E1F53A0}" type="datetimeFigureOut">
               <a:rPr lang="en-US" smtClean="0"/>
-              <a:t>6/10/15</a:t>
+              <a:t>10/7/2015</a:t>
             </a:fld>
             <a:endParaRPr lang="en-US"/>
           </a:p>
@@ -16310,7 +17172,7 @@
   <p:timing>
     <p:tnLst>
       <p:par>
-        <p:cTn xmlns:p14="http://schemas.microsoft.com/office/powerpoint/2010/main" id="1" dur="indefinite" restart="never" nodeType="tmRoot"/>
+        <p:cTn id="1" dur="indefinite" restart="never" nodeType="tmRoot"/>
       </p:par>
     </p:tnLst>
   </p:timing>
@@ -16497,7 +17359,7 @@
   <p:timing>
     <p:tnLst>
       <p:par>
-        <p:cTn xmlns:p14="http://schemas.microsoft.com/office/powerpoint/2010/main" id="1" dur="indefinite" restart="never" nodeType="tmRoot">
+        <p:cTn id="1" dur="indefinite" restart="never" nodeType="tmRoot">
           <p:childTnLst>
             <p:seq concurrent="1" nextAc="seek">
               <p:cTn id="2" dur="indefinite" nodeType="mainSeq">
@@ -17214,7 +18076,7 @@
   <p:timing>
     <p:tnLst>
       <p:par>
-        <p:cTn xmlns:p14="http://schemas.microsoft.com/office/powerpoint/2010/main" id="1" dur="indefinite" restart="never" nodeType="tmRoot">
+        <p:cTn id="1" dur="indefinite" restart="never" nodeType="tmRoot">
           <p:childTnLst>
             <p:seq concurrent="1" nextAc="seek">
               <p:cTn id="2" dur="indefinite" nodeType="mainSeq">
@@ -17637,7 +18499,7 @@
   <p:timing>
     <p:tnLst>
       <p:par>
-        <p:cTn xmlns:p14="http://schemas.microsoft.com/office/powerpoint/2010/main" id="1" dur="indefinite" restart="never" nodeType="tmRoot"/>
+        <p:cTn id="1" dur="indefinite" restart="never" nodeType="tmRoot"/>
       </p:par>
     </p:tnLst>
   </p:timing>
@@ -17705,7 +18567,7 @@
   <p:timing>
     <p:tnLst>
       <p:par>
-        <p:cTn xmlns:p14="http://schemas.microsoft.com/office/powerpoint/2010/main" id="1" dur="indefinite" restart="never" nodeType="tmRoot"/>
+        <p:cTn id="1" dur="indefinite" restart="never" nodeType="tmRoot"/>
       </p:par>
     </p:tnLst>
   </p:timing>
@@ -17774,7 +18636,7 @@
         </p:xfrm>
         <a:graphic>
           <a:graphicData uri="http://schemas.openxmlformats.org/drawingml/2006/diagram">
-            <dgm:relIds xmlns:dgm="http://schemas.openxmlformats.org/drawingml/2006/diagram" xmlns:r="http://schemas.openxmlformats.org/officeDocument/2006/relationships" r:dm="rId2" r:lo="rId3" r:qs="rId4" r:cs="rId5"/>
+            <dgm:relIds xmlns:dgm="http://schemas.openxmlformats.org/drawingml/2006/diagram" xmlns:r="http://schemas.openxmlformats.org/officeDocument/2006/relationships" r:dm="rId3" r:lo="rId4" r:qs="rId5" r:cs="rId6"/>
           </a:graphicData>
         </a:graphic>
       </p:graphicFrame>
@@ -17791,7 +18653,7 @@
   <p:timing>
     <p:tnLst>
       <p:par>
-        <p:cTn xmlns:p14="http://schemas.microsoft.com/office/powerpoint/2010/main" id="1" dur="indefinite" restart="never" nodeType="tmRoot"/>
+        <p:cTn id="1" dur="indefinite" restart="never" nodeType="tmRoot"/>
       </p:par>
     </p:tnLst>
   </p:timing>
@@ -17891,7 +18753,7 @@
   <p:timing>
     <p:tnLst>
       <p:par>
-        <p:cTn xmlns:p14="http://schemas.microsoft.com/office/powerpoint/2010/main" id="1" dur="indefinite" restart="never" nodeType="tmRoot"/>
+        <p:cTn id="1" dur="indefinite" restart="never" nodeType="tmRoot"/>
       </p:par>
     </p:tnLst>
   </p:timing>
@@ -17949,7 +18811,7 @@
             <p:ph idx="1"/>
             <p:extLst>
               <p:ext uri="{D42A27DB-BD31-4B8C-83A1-F6EECF244321}">
-                <p14:modId xmlns:p14="http://schemas.microsoft.com/office/powerpoint/2010/main" val="2974335986"/>
+                <p14:modId xmlns:p14="http://schemas.microsoft.com/office/powerpoint/2010/main" val="2961616898"/>
               </p:ext>
             </p:extLst>
           </p:nvPr>
@@ -17960,7 +18822,7 @@
         </p:xfrm>
         <a:graphic>
           <a:graphicData uri="http://schemas.openxmlformats.org/drawingml/2006/diagram">
-            <dgm:relIds xmlns:dgm="http://schemas.openxmlformats.org/drawingml/2006/diagram" xmlns:r="http://schemas.openxmlformats.org/officeDocument/2006/relationships" r:dm="rId2" r:lo="rId3" r:qs="rId4" r:cs="rId5"/>
+            <dgm:relIds xmlns:dgm="http://schemas.openxmlformats.org/drawingml/2006/diagram" xmlns:r="http://schemas.openxmlformats.org/officeDocument/2006/relationships" r:dm="rId3" r:lo="rId4" r:qs="rId5" r:cs="rId6"/>
           </a:graphicData>
         </a:graphic>
       </p:graphicFrame>
@@ -17977,7 +18839,7 @@
   <p:timing>
     <p:tnLst>
       <p:par>
-        <p:cTn xmlns:p14="http://schemas.microsoft.com/office/powerpoint/2010/main" id="1" dur="indefinite" restart="never" nodeType="tmRoot"/>
+        <p:cTn id="1" dur="indefinite" restart="never" nodeType="tmRoot"/>
       </p:par>
     </p:tnLst>
   </p:timing>
@@ -18208,11 +19070,11 @@
   <p:clrMapOvr>
     <a:masterClrMapping/>
   </p:clrMapOvr>
-  <p:transition xmlns:p14="http://schemas.microsoft.com/office/powerpoint/2010/main" spd="med"/>
+  <p:transition spd="med"/>
   <p:timing>
     <p:tnLst>
       <p:par>
-        <p:cTn xmlns:p14="http://schemas.microsoft.com/office/powerpoint/2010/main" id="1" dur="indefinite" restart="never" nodeType="tmRoot"/>
+        <p:cTn id="1" dur="indefinite" restart="never" nodeType="tmRoot"/>
       </p:par>
     </p:tnLst>
   </p:timing>
@@ -18418,11 +19280,11 @@
   <p:clrMapOvr>
     <a:masterClrMapping/>
   </p:clrMapOvr>
-  <p:transition xmlns:p14="http://schemas.microsoft.com/office/powerpoint/2010/main" spd="med"/>
+  <p:transition spd="med"/>
   <p:timing>
     <p:tnLst>
       <p:par>
-        <p:cTn xmlns:p14="http://schemas.microsoft.com/office/powerpoint/2010/main" id="1" dur="indefinite" restart="never" nodeType="tmRoot"/>
+        <p:cTn id="1" dur="indefinite" restart="never" nodeType="tmRoot"/>
       </p:par>
     </p:tnLst>
   </p:timing>
@@ -18550,11 +19412,11 @@
   <p:clrMapOvr>
     <a:masterClrMapping/>
   </p:clrMapOvr>
-  <p:transition xmlns:p14="http://schemas.microsoft.com/office/powerpoint/2010/main" spd="med"/>
+  <p:transition spd="med"/>
   <p:timing>
     <p:tnLst>
       <p:par>
-        <p:cTn xmlns:p14="http://schemas.microsoft.com/office/powerpoint/2010/main" id="1" dur="indefinite" restart="never" nodeType="tmRoot"/>
+        <p:cTn id="1" dur="indefinite" restart="never" nodeType="tmRoot"/>
       </p:par>
     </p:tnLst>
   </p:timing>
@@ -18637,7 +19499,7 @@
   <p:timing>
     <p:tnLst>
       <p:par>
-        <p:cTn xmlns:p14="http://schemas.microsoft.com/office/powerpoint/2010/main" id="1" dur="indefinite" restart="never" nodeType="tmRoot"/>
+        <p:cTn id="1" dur="indefinite" restart="never" nodeType="tmRoot"/>
       </p:par>
     </p:tnLst>
   </p:timing>
@@ -18679,11 +19541,7 @@
             <a:pPr algn="l"/>
             <a:r>
               <a:rPr lang="en-US" dirty="0" smtClean="0"/>
-              <a:t>8. </a:t>
-            </a:r>
-            <a:r>
-              <a:rPr lang="en-US" dirty="0" smtClean="0"/>
-              <a:t>Test for Team Profile</a:t>
+              <a:t>8. Test for Team Profile</a:t>
             </a:r>
             <a:endParaRPr lang="en-US" dirty="0"/>
           </a:p>
@@ -18754,7 +19612,7 @@
   <p:timing>
     <p:tnLst>
       <p:par>
-        <p:cTn xmlns:p14="http://schemas.microsoft.com/office/powerpoint/2010/main" id="1" dur="indefinite" restart="never" nodeType="tmRoot"/>
+        <p:cTn id="1" dur="indefinite" restart="never" nodeType="tmRoot"/>
       </p:par>
     </p:tnLst>
   </p:timing>
@@ -19012,4 +19870,265 @@
   </a:objectDefaults>
   <a:extraClrSchemeLst/>
 </a:theme>
+</file>
+
+<file path=ppt/theme/theme2.xml><?xml version="1.0" encoding="utf-8"?>
+<a:theme xmlns:a="http://schemas.openxmlformats.org/drawingml/2006/main" name="Office 主题">
+  <a:themeElements>
+    <a:clrScheme name="Office">
+      <a:dk1>
+        <a:sysClr val="windowText" lastClr="000000"/>
+      </a:dk1>
+      <a:lt1>
+        <a:sysClr val="window" lastClr="FFFFFF"/>
+      </a:lt1>
+      <a:dk2>
+        <a:srgbClr val="44546A"/>
+      </a:dk2>
+      <a:lt2>
+        <a:srgbClr val="E7E6E6"/>
+      </a:lt2>
+      <a:accent1>
+        <a:srgbClr val="5B9BD5"/>
+      </a:accent1>
+      <a:accent2>
+        <a:srgbClr val="ED7D31"/>
+      </a:accent2>
+      <a:accent3>
+        <a:srgbClr val="A5A5A5"/>
+      </a:accent3>
+      <a:accent4>
+        <a:srgbClr val="FFC000"/>
+      </a:accent4>
+      <a:accent5>
+        <a:srgbClr val="4472C4"/>
+      </a:accent5>
+      <a:accent6>
+        <a:srgbClr val="70AD47"/>
+      </a:accent6>
+      <a:hlink>
+        <a:srgbClr val="0563C1"/>
+      </a:hlink>
+      <a:folHlink>
+        <a:srgbClr val="954F72"/>
+      </a:folHlink>
+    </a:clrScheme>
+    <a:fontScheme name="Office">
+      <a:majorFont>
+        <a:latin typeface="Calibri Light" panose="020F0302020204030204"/>
+        <a:ea typeface=""/>
+        <a:cs typeface=""/>
+        <a:font script="Jpan" typeface="ＭＳ Ｐゴシック"/>
+        <a:font script="Hang" typeface="맑은 고딕"/>
+        <a:font script="Hans" typeface="宋体"/>
+        <a:font script="Hant" typeface="新細明體"/>
+        <a:font script="Arab" typeface="Times New Roman"/>
+        <a:font script="Hebr" typeface="Times New Roman"/>
+        <a:font script="Thai" typeface="Angsana New"/>
+        <a:font script="Ethi" typeface="Nyala"/>
+        <a:font script="Beng" typeface="Vrinda"/>
+        <a:font script="Gujr" typeface="Shruti"/>
+        <a:font script="Khmr" typeface="MoolBoran"/>
+        <a:font script="Knda" typeface="Tunga"/>
+        <a:font script="Guru" typeface="Raavi"/>
+        <a:font script="Cans" typeface="Euphemia"/>
+        <a:font script="Cher" typeface="Plantagenet Cherokee"/>
+        <a:font script="Yiii" typeface="Microsoft Yi Baiti"/>
+        <a:font script="Tibt" typeface="Microsoft Himalaya"/>
+        <a:font script="Thaa" typeface="MV Boli"/>
+        <a:font script="Deva" typeface="Mangal"/>
+        <a:font script="Telu" typeface="Gautami"/>
+        <a:font script="Taml" typeface="Latha"/>
+        <a:font script="Syrc" typeface="Estrangelo Edessa"/>
+        <a:font script="Orya" typeface="Kalinga"/>
+        <a:font script="Mlym" typeface="Kartika"/>
+        <a:font script="Laoo" typeface="DokChampa"/>
+        <a:font script="Sinh" typeface="Iskoola Pota"/>
+        <a:font script="Mong" typeface="Mongolian Baiti"/>
+        <a:font script="Viet" typeface="Times New Roman"/>
+        <a:font script="Uigh" typeface="Microsoft Uighur"/>
+        <a:font script="Geor" typeface="Sylfaen"/>
+      </a:majorFont>
+      <a:minorFont>
+        <a:latin typeface="Calibri" panose="020F0502020204030204"/>
+        <a:ea typeface=""/>
+        <a:cs typeface=""/>
+        <a:font script="Jpan" typeface="ＭＳ Ｐゴシック"/>
+        <a:font script="Hang" typeface="맑은 고딕"/>
+        <a:font script="Hans" typeface="宋体"/>
+        <a:font script="Hant" typeface="新細明體"/>
+        <a:font script="Arab" typeface="Arial"/>
+        <a:font script="Hebr" typeface="Arial"/>
+        <a:font script="Thai" typeface="Cordia New"/>
+        <a:font script="Ethi" typeface="Nyala"/>
+        <a:font script="Beng" typeface="Vrinda"/>
+        <a:font script="Gujr" typeface="Shruti"/>
+        <a:font script="Khmr" typeface="DaunPenh"/>
+        <a:font script="Knda" typeface="Tunga"/>
+        <a:font script="Guru" typeface="Raavi"/>
+        <a:font script="Cans" typeface="Euphemia"/>
+        <a:font script="Cher" typeface="Plantagenet Cherokee"/>
+        <a:font script="Yiii" typeface="Microsoft Yi Baiti"/>
+        <a:font script="Tibt" typeface="Microsoft Himalaya"/>
+        <a:font script="Thaa" typeface="MV Boli"/>
+        <a:font script="Deva" typeface="Mangal"/>
+        <a:font script="Telu" typeface="Gautami"/>
+        <a:font script="Taml" typeface="Latha"/>
+        <a:font script="Syrc" typeface="Estrangelo Edessa"/>
+        <a:font script="Orya" typeface="Kalinga"/>
+        <a:font script="Mlym" typeface="Kartika"/>
+        <a:font script="Laoo" typeface="DokChampa"/>
+        <a:font script="Sinh" typeface="Iskoola Pota"/>
+        <a:font script="Mong" typeface="Mongolian Baiti"/>
+        <a:font script="Viet" typeface="Arial"/>
+        <a:font script="Uigh" typeface="Microsoft Uighur"/>
+        <a:font script="Geor" typeface="Sylfaen"/>
+      </a:minorFont>
+    </a:fontScheme>
+    <a:fmtScheme name="Office">
+      <a:fillStyleLst>
+        <a:solidFill>
+          <a:schemeClr val="phClr"/>
+        </a:solidFill>
+        <a:gradFill rotWithShape="1">
+          <a:gsLst>
+            <a:gs pos="0">
+              <a:schemeClr val="phClr">
+                <a:lumMod val="110000"/>
+                <a:satMod val="105000"/>
+                <a:tint val="67000"/>
+              </a:schemeClr>
+            </a:gs>
+            <a:gs pos="50000">
+              <a:schemeClr val="phClr">
+                <a:lumMod val="105000"/>
+                <a:satMod val="103000"/>
+                <a:tint val="73000"/>
+              </a:schemeClr>
+            </a:gs>
+            <a:gs pos="100000">
+              <a:schemeClr val="phClr">
+                <a:lumMod val="105000"/>
+                <a:satMod val="109000"/>
+                <a:tint val="81000"/>
+              </a:schemeClr>
+            </a:gs>
+          </a:gsLst>
+          <a:lin ang="5400000" scaled="0"/>
+        </a:gradFill>
+        <a:gradFill rotWithShape="1">
+          <a:gsLst>
+            <a:gs pos="0">
+              <a:schemeClr val="phClr">
+                <a:satMod val="103000"/>
+                <a:lumMod val="102000"/>
+                <a:tint val="94000"/>
+              </a:schemeClr>
+            </a:gs>
+            <a:gs pos="50000">
+              <a:schemeClr val="phClr">
+                <a:satMod val="110000"/>
+                <a:lumMod val="100000"/>
+                <a:shade val="100000"/>
+              </a:schemeClr>
+            </a:gs>
+            <a:gs pos="100000">
+              <a:schemeClr val="phClr">
+                <a:lumMod val="99000"/>
+                <a:satMod val="120000"/>
+                <a:shade val="78000"/>
+              </a:schemeClr>
+            </a:gs>
+          </a:gsLst>
+          <a:lin ang="5400000" scaled="0"/>
+        </a:gradFill>
+      </a:fillStyleLst>
+      <a:lnStyleLst>
+        <a:ln w="6350" cap="flat" cmpd="sng" algn="ctr">
+          <a:solidFill>
+            <a:schemeClr val="phClr"/>
+          </a:solidFill>
+          <a:prstDash val="solid"/>
+          <a:miter lim="800000"/>
+        </a:ln>
+        <a:ln w="12700" cap="flat" cmpd="sng" algn="ctr">
+          <a:solidFill>
+            <a:schemeClr val="phClr"/>
+          </a:solidFill>
+          <a:prstDash val="solid"/>
+          <a:miter lim="800000"/>
+        </a:ln>
+        <a:ln w="19050" cap="flat" cmpd="sng" algn="ctr">
+          <a:solidFill>
+            <a:schemeClr val="phClr"/>
+          </a:solidFill>
+          <a:prstDash val="solid"/>
+          <a:miter lim="800000"/>
+        </a:ln>
+      </a:lnStyleLst>
+      <a:effectStyleLst>
+        <a:effectStyle>
+          <a:effectLst/>
+        </a:effectStyle>
+        <a:effectStyle>
+          <a:effectLst/>
+        </a:effectStyle>
+        <a:effectStyle>
+          <a:effectLst>
+            <a:outerShdw blurRad="57150" dist="19050" dir="5400000" algn="ctr" rotWithShape="0">
+              <a:srgbClr val="000000">
+                <a:alpha val="63000"/>
+              </a:srgbClr>
+            </a:outerShdw>
+          </a:effectLst>
+        </a:effectStyle>
+      </a:effectStyleLst>
+      <a:bgFillStyleLst>
+        <a:solidFill>
+          <a:schemeClr val="phClr"/>
+        </a:solidFill>
+        <a:solidFill>
+          <a:schemeClr val="phClr">
+            <a:tint val="95000"/>
+            <a:satMod val="170000"/>
+          </a:schemeClr>
+        </a:solidFill>
+        <a:gradFill rotWithShape="1">
+          <a:gsLst>
+            <a:gs pos="0">
+              <a:schemeClr val="phClr">
+                <a:tint val="93000"/>
+                <a:satMod val="150000"/>
+                <a:shade val="98000"/>
+                <a:lumMod val="102000"/>
+              </a:schemeClr>
+            </a:gs>
+            <a:gs pos="50000">
+              <a:schemeClr val="phClr">
+                <a:tint val="98000"/>
+                <a:satMod val="130000"/>
+                <a:shade val="90000"/>
+                <a:lumMod val="103000"/>
+              </a:schemeClr>
+            </a:gs>
+            <a:gs pos="100000">
+              <a:schemeClr val="phClr">
+                <a:shade val="63000"/>
+                <a:satMod val="120000"/>
+              </a:schemeClr>
+            </a:gs>
+          </a:gsLst>
+          <a:lin ang="5400000" scaled="0"/>
+        </a:gradFill>
+      </a:bgFillStyleLst>
+    </a:fmtScheme>
+  </a:themeElements>
+  <a:objectDefaults/>
+  <a:extraClrSchemeLst/>
+  <a:extLst>
+    <a:ext uri="{05A4C25C-085E-4340-85A3-A5531E510DB2}">
+      <thm15:themeFamily xmlns:thm15="http://schemas.microsoft.com/office/thememl/2012/main" name="Office Theme" id="{62F939B6-93AF-4DB8-9C6B-D6C7DFDC589F}" vid="{4A3C46E8-61CC-4603-A589-7422A47A8E4A}"/>
+    </a:ext>
+  </a:extLst>
+</a:theme>
 </file>
</xml_diff>

<commit_message>
Update format for MS windows. (Kaii)
</commit_message>
<xml_diff>
--- a/PCB/09 Final/Final Presentation (VEL).pptx
+++ b/PCB/09 Final/Final Presentation (VEL).pptx
@@ -122,7 +122,7 @@
 <file path=ppt/charts/chart1.xml><?xml version="1.0" encoding="utf-8"?>
 <c:chartSpace xmlns:c="http://schemas.openxmlformats.org/drawingml/2006/chart" xmlns:a="http://schemas.openxmlformats.org/drawingml/2006/main" xmlns:r="http://schemas.openxmlformats.org/officeDocument/2006/relationships">
   <c:date1904 val="0"/>
-  <c:lang val="en-US"/>
+  <c:lang val="en-NZ"/>
   <c:roundedCorners val="0"/>
   <mc:AlternateContent xmlns:mc="http://schemas.openxmlformats.org/markup-compatibility/2006">
     <mc:Choice xmlns:c14="http://schemas.microsoft.com/office/drawing/2007/8/2/chart" Requires="c14">
@@ -199,13 +199,13 @@
                 <c:formatCode>General</c:formatCode>
                 <c:ptCount val="3"/>
                 <c:pt idx="0">
-                  <c:v>14.0</c:v>
+                  <c:v>14</c:v>
                 </c:pt>
                 <c:pt idx="1">
-                  <c:v>53.0</c:v>
+                  <c:v>53</c:v>
                 </c:pt>
                 <c:pt idx="2">
-                  <c:v>15.0</c:v>
+                  <c:v>15</c:v>
                 </c:pt>
               </c:numCache>
             </c:numRef>
@@ -221,11 +221,11 @@
           <c:showBubbleSize val="0"/>
         </c:dLbls>
         <c:gapWidth val="150"/>
-        <c:axId val="2104607736"/>
-        <c:axId val="2021288008"/>
+        <c:axId val="202353664"/>
+        <c:axId val="55263808"/>
       </c:barChart>
       <c:catAx>
-        <c:axId val="2104607736"/>
+        <c:axId val="202353664"/>
         <c:scaling>
           <c:orientation val="minMax"/>
         </c:scaling>
@@ -244,14 +244,15 @@
             <a:endParaRPr lang="en-US"/>
           </a:p>
         </c:txPr>
-        <c:crossAx val="2021288008"/>
+        <c:crossAx val="55263808"/>
+        <c:crosses val="autoZero"/>
         <c:auto val="1"/>
         <c:lblAlgn val="ctr"/>
         <c:lblOffset val="100"/>
         <c:noMultiLvlLbl val="0"/>
       </c:catAx>
       <c:valAx>
-        <c:axId val="2021288008"/>
+        <c:axId val="55263808"/>
         <c:scaling>
           <c:orientation val="minMax"/>
         </c:scaling>
@@ -272,9 +273,10 @@
             <a:endParaRPr lang="en-US"/>
           </a:p>
         </c:txPr>
-        <c:crossAx val="2104607736"/>
+        <c:crossAx val="202353664"/>
+        <c:crosses val="autoZero"/>
         <c:crossBetween val="between"/>
-        <c:minorUnit val="2.0"/>
+        <c:minorUnit val="2"/>
       </c:valAx>
     </c:plotArea>
     <c:plotVisOnly val="1"/>
@@ -4217,20 +4219,20 @@
     </dgm:pt>
   </dgm:ptLst>
   <dgm:cxnLst>
-    <dgm:cxn modelId="{84544EE7-8CB1-AF42-9FBB-691C7DEF80DE}" type="presOf" srcId="{635710EA-A60C-164E-8640-52B6C841BC9E}" destId="{857336E1-C502-164D-B27E-204B55F12B46}" srcOrd="0" destOrd="0" presId="urn:microsoft.com/office/officeart/2005/8/layout/vList2"/>
+    <dgm:cxn modelId="{05750A63-4A3C-9A4D-A3AC-F49DA48EF246}" type="presOf" srcId="{16F69D2B-1D61-044B-B907-2BC496489CA2}" destId="{08767A90-FC64-A640-AB10-F397ACBFCD39}" srcOrd="0" destOrd="0" presId="urn:microsoft.com/office/officeart/2005/8/layout/vList2"/>
+    <dgm:cxn modelId="{CBECD9F6-F133-BB43-9584-9C7DDB9F546E}" srcId="{16F69D2B-1D61-044B-B907-2BC496489CA2}" destId="{77A4A170-B88B-8D44-A48F-8C4010B3DE79}" srcOrd="3" destOrd="0" parTransId="{8F5409DE-5454-5E43-8B6F-E9F8BF989B31}" sibTransId="{12F9B7CD-4D3B-9347-B78E-83D76CB4DC0D}"/>
+    <dgm:cxn modelId="{733EB60D-21D2-EC44-B0D9-2A4008B02C95}" type="presOf" srcId="{31EF168A-75A2-E448-A575-CFF9572854DB}" destId="{440EE334-38B5-F140-B895-40C7D631FE65}" srcOrd="0" destOrd="0" presId="urn:microsoft.com/office/officeart/2005/8/layout/vList2"/>
     <dgm:cxn modelId="{A558A68E-F4B9-9C4F-80E4-1482A3F6EAF6}" type="presOf" srcId="{65E35284-295B-C64C-88E5-B8163F602EF9}" destId="{D0FD7599-9CD0-B444-A2FB-F138B112482A}" srcOrd="0" destOrd="2" presId="urn:microsoft.com/office/officeart/2005/8/layout/vList2"/>
-    <dgm:cxn modelId="{733EB60D-21D2-EC44-B0D9-2A4008B02C95}" type="presOf" srcId="{31EF168A-75A2-E448-A575-CFF9572854DB}" destId="{440EE334-38B5-F140-B895-40C7D631FE65}" srcOrd="0" destOrd="0" presId="urn:microsoft.com/office/officeart/2005/8/layout/vList2"/>
-    <dgm:cxn modelId="{7498D8CC-800F-EA4E-BCDD-E909A176BB0A}" type="presOf" srcId="{5BA38324-039F-FF46-B3AA-A603FB72246C}" destId="{D0FD7599-9CD0-B444-A2FB-F138B112482A}" srcOrd="0" destOrd="0" presId="urn:microsoft.com/office/officeart/2005/8/layout/vList2"/>
+    <dgm:cxn modelId="{5ABD33AD-F9B3-174A-9BEB-2DA5138FD2C5}" type="presOf" srcId="{8E121E5C-904E-B445-912F-7DD49750F2F9}" destId="{D0FD7599-9CD0-B444-A2FB-F138B112482A}" srcOrd="0" destOrd="1" presId="urn:microsoft.com/office/officeart/2005/8/layout/vList2"/>
+    <dgm:cxn modelId="{263E0935-4E5A-2848-A15A-220653DB801E}" srcId="{635710EA-A60C-164E-8640-52B6C841BC9E}" destId="{16F69D2B-1D61-044B-B907-2BC496489CA2}" srcOrd="1" destOrd="0" parTransId="{7D6C4DB7-78AF-B244-87DE-C8359DD86E19}" sibTransId="{19F9BD0B-86E8-A344-B6F0-49FA00C169C2}"/>
+    <dgm:cxn modelId="{F47196EF-5B4D-CB44-B08D-39CAA41B1DFD}" type="presOf" srcId="{695F007A-BED9-D040-92EE-6D3D1D9E402A}" destId="{72FBFCEB-0DE1-5049-96FC-8A5D2AF08E2D}" srcOrd="0" destOrd="0" presId="urn:microsoft.com/office/officeart/2005/8/layout/vList2"/>
+    <dgm:cxn modelId="{FE654A1D-AE61-7B44-BA0D-5FBDAAC53D0F}" srcId="{16F69D2B-1D61-044B-B907-2BC496489CA2}" destId="{65E35284-295B-C64C-88E5-B8163F602EF9}" srcOrd="2" destOrd="0" parTransId="{AE1BA247-3926-794A-A6D5-D60EE7B21C27}" sibTransId="{8BB72BF5-8152-8D4D-AF77-D6A4CD93DCC3}"/>
     <dgm:cxn modelId="{C26C5B19-20CC-604C-8AB0-B3BDA2C0037D}" srcId="{16F69D2B-1D61-044B-B907-2BC496489CA2}" destId="{8E121E5C-904E-B445-912F-7DD49750F2F9}" srcOrd="1" destOrd="0" parTransId="{90AC7133-AB70-AE4B-B954-A9B382CFD2BF}" sibTransId="{6E97980D-69A1-D14D-AC80-28DBDC439478}"/>
     <dgm:cxn modelId="{BE1853BA-E4B9-8141-BC44-19F67F520911}" type="presOf" srcId="{77A4A170-B88B-8D44-A48F-8C4010B3DE79}" destId="{D0FD7599-9CD0-B444-A2FB-F138B112482A}" srcOrd="0" destOrd="3" presId="urn:microsoft.com/office/officeart/2005/8/layout/vList2"/>
-    <dgm:cxn modelId="{FE654A1D-AE61-7B44-BA0D-5FBDAAC53D0F}" srcId="{16F69D2B-1D61-044B-B907-2BC496489CA2}" destId="{65E35284-295B-C64C-88E5-B8163F602EF9}" srcOrd="2" destOrd="0" parTransId="{AE1BA247-3926-794A-A6D5-D60EE7B21C27}" sibTransId="{8BB72BF5-8152-8D4D-AF77-D6A4CD93DCC3}"/>
-    <dgm:cxn modelId="{5ABD33AD-F9B3-174A-9BEB-2DA5138FD2C5}" type="presOf" srcId="{8E121E5C-904E-B445-912F-7DD49750F2F9}" destId="{D0FD7599-9CD0-B444-A2FB-F138B112482A}" srcOrd="0" destOrd="1" presId="urn:microsoft.com/office/officeart/2005/8/layout/vList2"/>
-    <dgm:cxn modelId="{263E0935-4E5A-2848-A15A-220653DB801E}" srcId="{635710EA-A60C-164E-8640-52B6C841BC9E}" destId="{16F69D2B-1D61-044B-B907-2BC496489CA2}" srcOrd="1" destOrd="0" parTransId="{7D6C4DB7-78AF-B244-87DE-C8359DD86E19}" sibTransId="{19F9BD0B-86E8-A344-B6F0-49FA00C169C2}"/>
+    <dgm:cxn modelId="{D49B37DF-535E-8847-8C2C-E8757CA3838E}" srcId="{635710EA-A60C-164E-8640-52B6C841BC9E}" destId="{31EF168A-75A2-E448-A575-CFF9572854DB}" srcOrd="0" destOrd="0" parTransId="{0FA76EBC-F30E-BF48-BDDF-285AE21F4E5D}" sibTransId="{B665234A-BF19-684B-8DD4-F37311963C12}"/>
+    <dgm:cxn modelId="{84544EE7-8CB1-AF42-9FBB-691C7DEF80DE}" type="presOf" srcId="{635710EA-A60C-164E-8640-52B6C841BC9E}" destId="{857336E1-C502-164D-B27E-204B55F12B46}" srcOrd="0" destOrd="0" presId="urn:microsoft.com/office/officeart/2005/8/layout/vList2"/>
+    <dgm:cxn modelId="{7498D8CC-800F-EA4E-BCDD-E909A176BB0A}" type="presOf" srcId="{5BA38324-039F-FF46-B3AA-A603FB72246C}" destId="{D0FD7599-9CD0-B444-A2FB-F138B112482A}" srcOrd="0" destOrd="0" presId="urn:microsoft.com/office/officeart/2005/8/layout/vList2"/>
     <dgm:cxn modelId="{E4D4FFB0-1522-7C47-9290-C1EE54978958}" srcId="{16F69D2B-1D61-044B-B907-2BC496489CA2}" destId="{5BA38324-039F-FF46-B3AA-A603FB72246C}" srcOrd="0" destOrd="0" parTransId="{A2F46C4A-2BF0-9F4F-AC10-266B821DE910}" sibTransId="{B794A424-0D01-E646-BB7D-745C7E0913A5}"/>
-    <dgm:cxn modelId="{D49B37DF-535E-8847-8C2C-E8757CA3838E}" srcId="{635710EA-A60C-164E-8640-52B6C841BC9E}" destId="{31EF168A-75A2-E448-A575-CFF9572854DB}" srcOrd="0" destOrd="0" parTransId="{0FA76EBC-F30E-BF48-BDDF-285AE21F4E5D}" sibTransId="{B665234A-BF19-684B-8DD4-F37311963C12}"/>
-    <dgm:cxn modelId="{F47196EF-5B4D-CB44-B08D-39CAA41B1DFD}" type="presOf" srcId="{695F007A-BED9-D040-92EE-6D3D1D9E402A}" destId="{72FBFCEB-0DE1-5049-96FC-8A5D2AF08E2D}" srcOrd="0" destOrd="0" presId="urn:microsoft.com/office/officeart/2005/8/layout/vList2"/>
-    <dgm:cxn modelId="{05750A63-4A3C-9A4D-A3AC-F49DA48EF246}" type="presOf" srcId="{16F69D2B-1D61-044B-B907-2BC496489CA2}" destId="{08767A90-FC64-A640-AB10-F397ACBFCD39}" srcOrd="0" destOrd="0" presId="urn:microsoft.com/office/officeart/2005/8/layout/vList2"/>
-    <dgm:cxn modelId="{CBECD9F6-F133-BB43-9584-9C7DDB9F546E}" srcId="{16F69D2B-1D61-044B-B907-2BC496489CA2}" destId="{77A4A170-B88B-8D44-A48F-8C4010B3DE79}" srcOrd="3" destOrd="0" parTransId="{8F5409DE-5454-5E43-8B6F-E9F8BF989B31}" sibTransId="{12F9B7CD-4D3B-9347-B78E-83D76CB4DC0D}"/>
     <dgm:cxn modelId="{8C1EFD26-6248-934B-B143-5259D0255B7F}" srcId="{31EF168A-75A2-E448-A575-CFF9572854DB}" destId="{695F007A-BED9-D040-92EE-6D3D1D9E402A}" srcOrd="0" destOrd="0" parTransId="{373D84C7-85EB-B349-96AD-F68C63454E64}" sibTransId="{9766473D-5357-0844-B789-47FE6D84D1FB}"/>
     <dgm:cxn modelId="{BCE58D41-ECB0-294E-9134-AC9D8720790A}" type="presParOf" srcId="{857336E1-C502-164D-B27E-204B55F12B46}" destId="{440EE334-38B5-F140-B895-40C7D631FE65}" srcOrd="0" destOrd="0" presId="urn:microsoft.com/office/officeart/2005/8/layout/vList2"/>
     <dgm:cxn modelId="{BD84EAA5-4DD0-0B41-B77C-A5B477A3CABC}" type="presParOf" srcId="{857336E1-C502-164D-B27E-204B55F12B46}" destId="{72FBFCEB-0DE1-5049-96FC-8A5D2AF08E2D}" srcOrd="1" destOrd="0" presId="urn:microsoft.com/office/officeart/2005/8/layout/vList2"/>
@@ -4339,8 +4341,8 @@
       </dsp:nvSpPr>
       <dsp:spPr>
         <a:xfrm>
-          <a:off x="2310" y="1305401"/>
-          <a:ext cx="1390955" cy="1740535"/>
+          <a:off x="6558" y="1305401"/>
+          <a:ext cx="1400654" cy="1740535"/>
         </a:xfrm>
         <a:prstGeom prst="roundRect">
           <a:avLst/>
@@ -4442,8 +4444,8 @@
         </a:p>
       </dsp:txBody>
       <dsp:txXfrm>
-        <a:off x="70211" y="1373302"/>
-        <a:ext cx="1255153" cy="1604733"/>
+        <a:off x="74932" y="1373775"/>
+        <a:ext cx="1263906" cy="1603787"/>
       </dsp:txXfrm>
     </dsp:sp>
     <dsp:sp modelId="{DEE11F54-F33F-4A66-B970-F3633A9FFD6B}">
@@ -4453,8 +4455,8 @@
       </dsp:nvSpPr>
       <dsp:spPr>
         <a:xfrm>
-          <a:off x="1625091" y="1305401"/>
-          <a:ext cx="1390955" cy="1740535"/>
+          <a:off x="1624790" y="1305401"/>
+          <a:ext cx="1400654" cy="1740535"/>
         </a:xfrm>
         <a:prstGeom prst="roundRect">
           <a:avLst/>
@@ -4556,8 +4558,8 @@
         </a:p>
       </dsp:txBody>
       <dsp:txXfrm>
-        <a:off x="1692992" y="1373302"/>
-        <a:ext cx="1255153" cy="1604733"/>
+        <a:off x="1693164" y="1373775"/>
+        <a:ext cx="1263906" cy="1603787"/>
       </dsp:txXfrm>
     </dsp:sp>
     <dsp:sp modelId="{0117DB4E-0120-41C9-8BEE-FC8E23C9928E}">
@@ -4567,8 +4569,8 @@
       </dsp:nvSpPr>
       <dsp:spPr>
         <a:xfrm>
-          <a:off x="3247872" y="1305401"/>
-          <a:ext cx="1390955" cy="1740535"/>
+          <a:off x="3243022" y="1305401"/>
+          <a:ext cx="1400654" cy="1740535"/>
         </a:xfrm>
         <a:prstGeom prst="roundRect">
           <a:avLst/>
@@ -4670,8 +4672,8 @@
         </a:p>
       </dsp:txBody>
       <dsp:txXfrm>
-        <a:off x="3315773" y="1373302"/>
-        <a:ext cx="1255153" cy="1604733"/>
+        <a:off x="3311396" y="1373775"/>
+        <a:ext cx="1263906" cy="1603787"/>
       </dsp:txXfrm>
     </dsp:sp>
     <dsp:sp modelId="{6DA9CE7A-F212-479F-87FE-170E740A2FF0}">
@@ -4681,8 +4683,8 @@
       </dsp:nvSpPr>
       <dsp:spPr>
         <a:xfrm>
-          <a:off x="4870653" y="1305401"/>
-          <a:ext cx="1390955" cy="1740535"/>
+          <a:off x="4861254" y="1305401"/>
+          <a:ext cx="1400654" cy="1740535"/>
         </a:xfrm>
         <a:prstGeom prst="roundRect">
           <a:avLst/>
@@ -4784,8 +4786,8 @@
         </a:p>
       </dsp:txBody>
       <dsp:txXfrm>
-        <a:off x="4938554" y="1373302"/>
-        <a:ext cx="1255153" cy="1604733"/>
+        <a:off x="4929628" y="1373775"/>
+        <a:ext cx="1263906" cy="1603787"/>
       </dsp:txXfrm>
     </dsp:sp>
     <dsp:sp modelId="{4FB3022B-41A7-4292-9A6A-7C5D83ECA5E2}">
@@ -4795,8 +4797,8 @@
       </dsp:nvSpPr>
       <dsp:spPr>
         <a:xfrm>
-          <a:off x="6493434" y="1305401"/>
-          <a:ext cx="1390955" cy="1740535"/>
+          <a:off x="6479486" y="1305401"/>
+          <a:ext cx="1400654" cy="1740535"/>
         </a:xfrm>
         <a:prstGeom prst="roundRect">
           <a:avLst/>
@@ -4898,8 +4900,8 @@
         </a:p>
       </dsp:txBody>
       <dsp:txXfrm>
-        <a:off x="6561335" y="1373302"/>
-        <a:ext cx="1255153" cy="1604733"/>
+        <a:off x="6547860" y="1373775"/>
+        <a:ext cx="1263906" cy="1603787"/>
       </dsp:txXfrm>
     </dsp:sp>
   </dsp:spTree>
@@ -5009,12 +5011,12 @@
         </a:fontRef>
       </dsp:style>
       <dsp:txBody>
-        <a:bodyPr spcFirstLastPara="0" vert="horz" wrap="square" lIns="401565" tIns="66040" rIns="66040" bIns="66040" numCol="1" spcCol="1270" anchor="ctr" anchorCtr="0">
+        <a:bodyPr spcFirstLastPara="0" vert="horz" wrap="square" lIns="401565" tIns="63500" rIns="63500" bIns="63500" numCol="1" spcCol="1270" anchor="ctr" anchorCtr="0">
           <a:noAutofit/>
         </a:bodyPr>
         <a:lstStyle/>
         <a:p>
-          <a:pPr lvl="0" algn="l" defTabSz="1155700">
+          <a:pPr lvl="0" algn="l" defTabSz="1111250">
             <a:lnSpc>
               <a:spcPct val="90000"/>
             </a:lnSpc>
@@ -5026,10 +5028,10 @@
             </a:spcAft>
           </a:pPr>
           <a:r>
-            <a:rPr lang="en-US" sz="2600" kern="1200" dirty="0" smtClean="0"/>
+            <a:rPr lang="en-US" sz="2500" kern="1200" dirty="0" smtClean="0"/>
             <a:t>Homepage polish</a:t>
           </a:r>
-          <a:endParaRPr lang="en-US" sz="2600" kern="1200" dirty="0"/>
+          <a:endParaRPr lang="en-US" sz="2500" kern="1200" dirty="0"/>
         </a:p>
       </dsp:txBody>
       <dsp:txXfrm>
@@ -5135,12 +5137,12 @@
         </a:fontRef>
       </dsp:style>
       <dsp:txBody>
-        <a:bodyPr spcFirstLastPara="0" vert="horz" wrap="square" lIns="401565" tIns="66040" rIns="66040" bIns="66040" numCol="1" spcCol="1270" anchor="ctr" anchorCtr="0">
+        <a:bodyPr spcFirstLastPara="0" vert="horz" wrap="square" lIns="401565" tIns="63500" rIns="63500" bIns="63500" numCol="1" spcCol="1270" anchor="ctr" anchorCtr="0">
           <a:noAutofit/>
         </a:bodyPr>
         <a:lstStyle/>
         <a:p>
-          <a:pPr lvl="0" algn="l" defTabSz="1155700">
+          <a:pPr lvl="0" algn="l" defTabSz="1111250">
             <a:lnSpc>
               <a:spcPct val="90000"/>
             </a:lnSpc>
@@ -5152,10 +5154,10 @@
             </a:spcAft>
           </a:pPr>
           <a:r>
-            <a:rPr lang="en-US" sz="2600" kern="1200" dirty="0" smtClean="0"/>
+            <a:rPr lang="en-US" sz="2500" kern="1200" dirty="0" smtClean="0"/>
             <a:t>Test automation page</a:t>
           </a:r>
-          <a:endParaRPr lang="en-US" sz="2600" kern="1200" dirty="0"/>
+          <a:endParaRPr lang="en-US" sz="2500" kern="1200" dirty="0"/>
         </a:p>
       </dsp:txBody>
       <dsp:txXfrm>
@@ -5261,12 +5263,12 @@
         </a:fontRef>
       </dsp:style>
       <dsp:txBody>
-        <a:bodyPr spcFirstLastPara="0" vert="horz" wrap="square" lIns="401565" tIns="66040" rIns="66040" bIns="66040" numCol="1" spcCol="1270" anchor="ctr" anchorCtr="0">
+        <a:bodyPr spcFirstLastPara="0" vert="horz" wrap="square" lIns="401565" tIns="63500" rIns="63500" bIns="63500" numCol="1" spcCol="1270" anchor="ctr" anchorCtr="0">
           <a:noAutofit/>
         </a:bodyPr>
         <a:lstStyle/>
         <a:p>
-          <a:pPr lvl="0" algn="l" defTabSz="1155700">
+          <a:pPr lvl="0" algn="l" defTabSz="1111250">
             <a:lnSpc>
               <a:spcPct val="90000"/>
             </a:lnSpc>
@@ -5278,10 +5280,10 @@
             </a:spcAft>
           </a:pPr>
           <a:r>
-            <a:rPr lang="en-US" sz="2600" kern="1200" dirty="0" smtClean="0"/>
+            <a:rPr lang="en-US" sz="2500" kern="1200" dirty="0" smtClean="0"/>
             <a:t>Contact us integration</a:t>
           </a:r>
-          <a:endParaRPr lang="en-US" sz="2600" kern="1200" dirty="0"/>
+          <a:endParaRPr lang="en-US" sz="2500" kern="1200" dirty="0"/>
         </a:p>
       </dsp:txBody>
       <dsp:txXfrm>
@@ -5387,12 +5389,12 @@
         </a:fontRef>
       </dsp:style>
       <dsp:txBody>
-        <a:bodyPr spcFirstLastPara="0" vert="horz" wrap="square" lIns="401565" tIns="66040" rIns="66040" bIns="66040" numCol="1" spcCol="1270" anchor="ctr" anchorCtr="0">
+        <a:bodyPr spcFirstLastPara="0" vert="horz" wrap="square" lIns="401565" tIns="63500" rIns="63500" bIns="63500" numCol="1" spcCol="1270" anchor="ctr" anchorCtr="0">
           <a:noAutofit/>
         </a:bodyPr>
         <a:lstStyle/>
         <a:p>
-          <a:pPr lvl="0" algn="l" defTabSz="1155700">
+          <a:pPr lvl="0" algn="l" defTabSz="1111250">
             <a:lnSpc>
               <a:spcPct val="90000"/>
             </a:lnSpc>
@@ -5404,10 +5406,10 @@
             </a:spcAft>
           </a:pPr>
           <a:r>
-            <a:rPr lang="en-US" sz="2600" kern="1200" dirty="0" smtClean="0"/>
+            <a:rPr lang="en-US" sz="2500" kern="1200" dirty="0" smtClean="0"/>
             <a:t>Dynamic Team profile</a:t>
           </a:r>
-          <a:endParaRPr lang="en-US" sz="2600" kern="1200" dirty="0"/>
+          <a:endParaRPr lang="en-US" sz="2500" kern="1200" dirty="0"/>
         </a:p>
       </dsp:txBody>
       <dsp:txXfrm>
@@ -5513,12 +5515,12 @@
         </a:fontRef>
       </dsp:style>
       <dsp:txBody>
-        <a:bodyPr spcFirstLastPara="0" vert="horz" wrap="square" lIns="401565" tIns="66040" rIns="66040" bIns="66040" numCol="1" spcCol="1270" anchor="ctr" anchorCtr="0">
+        <a:bodyPr spcFirstLastPara="0" vert="horz" wrap="square" lIns="401565" tIns="63500" rIns="63500" bIns="63500" numCol="1" spcCol="1270" anchor="ctr" anchorCtr="0">
           <a:noAutofit/>
         </a:bodyPr>
         <a:lstStyle/>
         <a:p>
-          <a:pPr lvl="0" algn="l" defTabSz="1155700">
+          <a:pPr lvl="0" algn="l" defTabSz="1111250">
             <a:lnSpc>
               <a:spcPct val="90000"/>
             </a:lnSpc>
@@ -5530,10 +5532,10 @@
             </a:spcAft>
           </a:pPr>
           <a:r>
-            <a:rPr lang="en-US" altLang="zh-CN" sz="2600" kern="1200" dirty="0" smtClean="0"/>
+            <a:rPr lang="en-US" altLang="zh-CN" sz="2500" kern="1200" dirty="0" smtClean="0"/>
             <a:t>New success stories List</a:t>
           </a:r>
-          <a:endParaRPr lang="en-US" sz="2600" kern="1200" dirty="0"/>
+          <a:endParaRPr lang="en-US" sz="2500" kern="1200" dirty="0"/>
         </a:p>
       </dsp:txBody>
       <dsp:txXfrm>
@@ -5639,12 +5641,12 @@
         </a:fontRef>
       </dsp:style>
       <dsp:txBody>
-        <a:bodyPr spcFirstLastPara="0" vert="horz" wrap="square" lIns="401565" tIns="66040" rIns="66040" bIns="66040" numCol="1" spcCol="1270" anchor="ctr" anchorCtr="0">
+        <a:bodyPr spcFirstLastPara="0" vert="horz" wrap="square" lIns="401565" tIns="63500" rIns="63500" bIns="63500" numCol="1" spcCol="1270" anchor="ctr" anchorCtr="0">
           <a:noAutofit/>
         </a:bodyPr>
         <a:lstStyle/>
         <a:p>
-          <a:pPr lvl="0" algn="l" defTabSz="1155700">
+          <a:pPr lvl="0" algn="l" defTabSz="1111250">
             <a:lnSpc>
               <a:spcPct val="90000"/>
             </a:lnSpc>
@@ -5656,10 +5658,10 @@
             </a:spcAft>
           </a:pPr>
           <a:r>
-            <a:rPr lang="en-US" sz="2600" kern="1200" dirty="0" smtClean="0"/>
+            <a:rPr lang="en-US" sz="2500" kern="1200" dirty="0" smtClean="0"/>
             <a:t>Research on Google searching strategies</a:t>
           </a:r>
-          <a:endParaRPr lang="en-US" sz="2600" kern="1200" dirty="0"/>
+          <a:endParaRPr lang="en-US" sz="2500" kern="1200" dirty="0"/>
         </a:p>
       </dsp:txBody>
       <dsp:txXfrm>
@@ -5734,7 +5736,7 @@
       </dsp:nvSpPr>
       <dsp:spPr>
         <a:xfrm>
-          <a:off x="0" y="112066"/>
+          <a:off x="0" y="162522"/>
           <a:ext cx="6932613" cy="795483"/>
         </a:xfrm>
         <a:prstGeom prst="roundRect">
@@ -5838,7 +5840,7 @@
         </a:p>
       </dsp:txBody>
       <dsp:txXfrm>
-        <a:off x="38832" y="150898"/>
+        <a:off x="38832" y="201354"/>
         <a:ext cx="6854949" cy="717819"/>
       </dsp:txXfrm>
     </dsp:sp>
@@ -5849,7 +5851,7 @@
       </dsp:nvSpPr>
       <dsp:spPr>
         <a:xfrm>
-          <a:off x="0" y="907549"/>
+          <a:off x="0" y="958005"/>
           <a:ext cx="6932613" cy="1076400"/>
         </a:xfrm>
         <a:prstGeom prst="rect">
@@ -5899,7 +5901,7 @@
         </a:p>
       </dsp:txBody>
       <dsp:txXfrm>
-        <a:off x="0" y="907549"/>
+        <a:off x="0" y="958005"/>
         <a:ext cx="6932613" cy="1076400"/>
       </dsp:txXfrm>
     </dsp:sp>
@@ -5910,7 +5912,7 @@
       </dsp:nvSpPr>
       <dsp:spPr>
         <a:xfrm>
-          <a:off x="0" y="1983949"/>
+          <a:off x="0" y="2034405"/>
           <a:ext cx="6932613" cy="795483"/>
         </a:xfrm>
         <a:prstGeom prst="roundRect">
@@ -6014,7 +6016,7 @@
         </a:p>
       </dsp:txBody>
       <dsp:txXfrm>
-        <a:off x="38832" y="2022781"/>
+        <a:off x="38832" y="2073237"/>
         <a:ext cx="6854949" cy="717819"/>
       </dsp:txXfrm>
     </dsp:sp>
@@ -6025,8 +6027,8 @@
       </dsp:nvSpPr>
       <dsp:spPr>
         <a:xfrm>
-          <a:off x="0" y="2779432"/>
-          <a:ext cx="6932613" cy="1883700"/>
+          <a:off x="0" y="2829888"/>
+          <a:ext cx="6932613" cy="1782787"/>
         </a:xfrm>
         <a:prstGeom prst="rect">
           <a:avLst/>
@@ -6132,8 +6134,8 @@
         </a:p>
       </dsp:txBody>
       <dsp:txXfrm>
-        <a:off x="0" y="2779432"/>
-        <a:ext cx="6932613" cy="1883700"/>
+        <a:off x="0" y="2829888"/>
+        <a:ext cx="6932613" cy="1782787"/>
       </dsp:txXfrm>
     </dsp:sp>
   </dsp:spTree>
@@ -11145,7 +11147,7 @@
           <a:p>
             <a:fld id="{ED2281E1-4B7B-814B-A555-77F82E1F53A0}" type="datetimeFigureOut">
               <a:rPr lang="en-US" smtClean="0"/>
-              <a:t>6/10/15</a:t>
+              <a:t>10/7/2015</a:t>
             </a:fld>
             <a:endParaRPr lang="en-US"/>
           </a:p>
@@ -11477,7 +11479,7 @@
           <a:p>
             <a:fld id="{ED2281E1-4B7B-814B-A555-77F82E1F53A0}" type="datetimeFigureOut">
               <a:rPr lang="en-US" smtClean="0"/>
-              <a:t>6/10/15</a:t>
+              <a:t>10/7/2015</a:t>
             </a:fld>
             <a:endParaRPr lang="en-US"/>
           </a:p>
@@ -11809,7 +11811,7 @@
           <a:p>
             <a:fld id="{ED2281E1-4B7B-814B-A555-77F82E1F53A0}" type="datetimeFigureOut">
               <a:rPr lang="en-US" smtClean="0"/>
-              <a:t>6/10/15</a:t>
+              <a:t>10/7/2015</a:t>
             </a:fld>
             <a:endParaRPr lang="en-US"/>
           </a:p>
@@ -12141,7 +12143,7 @@
           <a:p>
             <a:fld id="{ED2281E1-4B7B-814B-A555-77F82E1F53A0}" type="datetimeFigureOut">
               <a:rPr lang="en-US" smtClean="0"/>
-              <a:t>6/10/15</a:t>
+              <a:t>10/7/2015</a:t>
             </a:fld>
             <a:endParaRPr lang="en-US"/>
           </a:p>
@@ -12830,7 +12832,7 @@
           <a:p>
             <a:fld id="{ED2281E1-4B7B-814B-A555-77F82E1F53A0}" type="datetimeFigureOut">
               <a:rPr lang="en-US" smtClean="0"/>
-              <a:t>6/10/15</a:t>
+              <a:t>10/7/2015</a:t>
             </a:fld>
             <a:endParaRPr lang="en-US"/>
           </a:p>
@@ -13009,7 +13011,7 @@
           <a:p>
             <a:fld id="{ED2281E1-4B7B-814B-A555-77F82E1F53A0}" type="datetimeFigureOut">
               <a:rPr lang="en-US" smtClean="0"/>
-              <a:t>6/10/15</a:t>
+              <a:t>10/7/2015</a:t>
             </a:fld>
             <a:endParaRPr lang="en-US"/>
           </a:p>
@@ -13234,7 +13236,7 @@
   <p:clrMapOvr>
     <a:masterClrMapping/>
   </p:clrMapOvr>
-  <p:transition xmlns:p14="http://schemas.microsoft.com/office/powerpoint/2010/main" spd="med"/>
+  <p:transition spd="med"/>
 </p:sldLayout>
 </file>
 
@@ -13302,7 +13304,7 @@
   <p:clrMapOvr>
     <a:masterClrMapping/>
   </p:clrMapOvr>
-  <p:transition xmlns:p14="http://schemas.microsoft.com/office/powerpoint/2010/main" spd="med"/>
+  <p:transition spd="med"/>
 </p:sldLayout>
 </file>
 
@@ -13424,7 +13426,7 @@
           <a:p>
             <a:fld id="{ED2281E1-4B7B-814B-A555-77F82E1F53A0}" type="datetimeFigureOut">
               <a:rPr lang="en-US" smtClean="0"/>
-              <a:t>6/10/15</a:t>
+              <a:t>10/7/2015</a:t>
             </a:fld>
             <a:endParaRPr lang="en-US"/>
           </a:p>
@@ -13672,7 +13674,7 @@
           <a:p>
             <a:fld id="{ED2281E1-4B7B-814B-A555-77F82E1F53A0}" type="datetimeFigureOut">
               <a:rPr lang="en-US" smtClean="0"/>
-              <a:t>6/10/15</a:t>
+              <a:t>10/7/2015</a:t>
             </a:fld>
             <a:endParaRPr lang="en-US"/>
           </a:p>
@@ -14002,7 +14004,7 @@
           <a:p>
             <a:fld id="{ED2281E1-4B7B-814B-A555-77F82E1F53A0}" type="datetimeFigureOut">
               <a:rPr lang="en-US" smtClean="0"/>
-              <a:t>6/10/15</a:t>
+              <a:t>10/7/2015</a:t>
             </a:fld>
             <a:endParaRPr lang="en-US"/>
           </a:p>
@@ -14294,7 +14296,7 @@
           <a:p>
             <a:fld id="{ED2281E1-4B7B-814B-A555-77F82E1F53A0}" type="datetimeFigureOut">
               <a:rPr lang="en-US" smtClean="0"/>
-              <a:t>6/10/15</a:t>
+              <a:t>10/7/2015</a:t>
             </a:fld>
             <a:endParaRPr lang="en-US"/>
           </a:p>
@@ -14730,7 +14732,7 @@
           <a:p>
             <a:fld id="{ED2281E1-4B7B-814B-A555-77F82E1F53A0}" type="datetimeFigureOut">
               <a:rPr lang="en-US" smtClean="0"/>
-              <a:t>6/10/15</a:t>
+              <a:t>10/7/2015</a:t>
             </a:fld>
             <a:endParaRPr lang="en-US"/>
           </a:p>
@@ -14917,7 +14919,7 @@
           <a:p>
             <a:fld id="{ED2281E1-4B7B-814B-A555-77F82E1F53A0}" type="datetimeFigureOut">
               <a:rPr lang="en-US" smtClean="0"/>
-              <a:t>6/10/15</a:t>
+              <a:t>10/7/2015</a:t>
             </a:fld>
             <a:endParaRPr lang="en-US"/>
           </a:p>
@@ -15007,7 +15009,7 @@
           <a:p>
             <a:fld id="{ED2281E1-4B7B-814B-A555-77F82E1F53A0}" type="datetimeFigureOut">
               <a:rPr lang="en-US" smtClean="0"/>
-              <a:t>6/10/15</a:t>
+              <a:t>10/7/2015</a:t>
             </a:fld>
             <a:endParaRPr lang="en-US"/>
           </a:p>
@@ -15288,7 +15290,7 @@
           <a:p>
             <a:fld id="{ED2281E1-4B7B-814B-A555-77F82E1F53A0}" type="datetimeFigureOut">
               <a:rPr lang="en-US" smtClean="0"/>
-              <a:t>6/10/15</a:t>
+              <a:t>10/7/2015</a:t>
             </a:fld>
             <a:endParaRPr lang="en-US"/>
           </a:p>
@@ -15503,7 +15505,7 @@
           <a:p>
             <a:fld id="{ED2281E1-4B7B-814B-A555-77F82E1F53A0}" type="datetimeFigureOut">
               <a:rPr lang="en-US" smtClean="0"/>
-              <a:t>6/10/15</a:t>
+              <a:t>10/7/2015</a:t>
             </a:fld>
             <a:endParaRPr lang="en-US"/>
           </a:p>
@@ -16015,8 +16017,8 @@
         </p:nvSpPr>
         <p:spPr>
           <a:xfrm>
-            <a:off x="6096001" y="3606798"/>
-            <a:ext cx="2294466" cy="877824"/>
+            <a:off x="5435600" y="3606798"/>
+            <a:ext cx="2954867" cy="877824"/>
           </a:xfrm>
         </p:spPr>
         <p:txBody>
@@ -16041,262 +16043,6 @@
           </a:p>
         </p:txBody>
       </p:sp>
-      <p:sp>
-        <p:nvSpPr>
-          <p:cNvPr id="4" name="Subtitle 2"/>
-          <p:cNvSpPr txBox="1">
-            <a:spLocks/>
-          </p:cNvSpPr>
-          <p:nvPr/>
-        </p:nvSpPr>
-        <p:spPr>
-          <a:xfrm>
-            <a:off x="5283195" y="3606798"/>
-            <a:ext cx="778933" cy="877824"/>
-          </a:xfrm>
-          <a:prstGeom prst="rect">
-            <a:avLst/>
-          </a:prstGeom>
-        </p:spPr>
-        <p:txBody>
-          <a:bodyPr vert="horz" lIns="91440" tIns="45720" rIns="91440" bIns="45720" rtlCol="0">
-            <a:noAutofit/>
-          </a:bodyPr>
-          <a:lstStyle>
-            <a:lvl1pPr marL="0" indent="0" algn="ctr" defTabSz="914400" rtl="0" eaLnBrk="1" latinLnBrk="0" hangingPunct="1">
-              <a:spcBef>
-                <a:spcPts val="300"/>
-              </a:spcBef>
-              <a:buFontTx/>
-              <a:buNone/>
-              <a:defRPr sz="2000" kern="1200">
-                <a:solidFill>
-                  <a:schemeClr val="tx1">
-                    <a:tint val="75000"/>
-                  </a:schemeClr>
-                </a:solidFill>
-                <a:effectLst>
-                  <a:outerShdw blurRad="50800" dist="50800" dir="5400000" sx="101000" sy="101000" algn="t" rotWithShape="0">
-                    <a:prstClr val="black">
-                      <a:alpha val="40000"/>
-                    </a:prstClr>
-                  </a:outerShdw>
-                </a:effectLst>
-                <a:latin typeface="+mn-lt"/>
-                <a:ea typeface="+mn-ea"/>
-                <a:cs typeface="+mn-cs"/>
-              </a:defRPr>
-            </a:lvl1pPr>
-            <a:lvl2pPr marL="457200" indent="0" algn="ctr" defTabSz="914400" rtl="0" eaLnBrk="1" latinLnBrk="0" hangingPunct="1">
-              <a:spcBef>
-                <a:spcPts val="600"/>
-              </a:spcBef>
-              <a:buFontTx/>
-              <a:buNone/>
-              <a:defRPr sz="2000" kern="1200">
-                <a:solidFill>
-                  <a:schemeClr val="tx1">
-                    <a:tint val="75000"/>
-                  </a:schemeClr>
-                </a:solidFill>
-                <a:effectLst>
-                  <a:outerShdw blurRad="50800" dist="50800" dir="5400000" sx="101000" sy="101000" algn="t" rotWithShape="0">
-                    <a:prstClr val="black">
-                      <a:alpha val="40000"/>
-                    </a:prstClr>
-                  </a:outerShdw>
-                </a:effectLst>
-                <a:latin typeface="+mn-lt"/>
-                <a:ea typeface="+mn-ea"/>
-                <a:cs typeface="+mn-cs"/>
-              </a:defRPr>
-            </a:lvl2pPr>
-            <a:lvl3pPr marL="914400" indent="0" algn="ctr" defTabSz="914400" rtl="0" eaLnBrk="1" latinLnBrk="0" hangingPunct="1">
-              <a:spcBef>
-                <a:spcPts val="600"/>
-              </a:spcBef>
-              <a:buFontTx/>
-              <a:buNone/>
-              <a:defRPr sz="1800" kern="1200">
-                <a:solidFill>
-                  <a:schemeClr val="tx1">
-                    <a:tint val="75000"/>
-                  </a:schemeClr>
-                </a:solidFill>
-                <a:effectLst>
-                  <a:outerShdw blurRad="50800" dist="50800" dir="5400000" sx="101000" sy="101000" algn="t" rotWithShape="0">
-                    <a:prstClr val="black">
-                      <a:alpha val="40000"/>
-                    </a:prstClr>
-                  </a:outerShdw>
-                </a:effectLst>
-                <a:latin typeface="+mn-lt"/>
-                <a:ea typeface="+mn-ea"/>
-                <a:cs typeface="+mn-cs"/>
-              </a:defRPr>
-            </a:lvl3pPr>
-            <a:lvl4pPr marL="1371600" indent="0" algn="ctr" defTabSz="914400" rtl="0" eaLnBrk="1" latinLnBrk="0" hangingPunct="1">
-              <a:spcBef>
-                <a:spcPts val="600"/>
-              </a:spcBef>
-              <a:buFontTx/>
-              <a:buNone/>
-              <a:defRPr sz="1800" kern="1200">
-                <a:solidFill>
-                  <a:schemeClr val="tx1">
-                    <a:tint val="75000"/>
-                  </a:schemeClr>
-                </a:solidFill>
-                <a:effectLst>
-                  <a:outerShdw blurRad="50800" dist="50800" dir="5400000" sx="101000" sy="101000" algn="t" rotWithShape="0">
-                    <a:prstClr val="black">
-                      <a:alpha val="40000"/>
-                    </a:prstClr>
-                  </a:outerShdw>
-                </a:effectLst>
-                <a:latin typeface="+mn-lt"/>
-                <a:ea typeface="+mn-ea"/>
-                <a:cs typeface="+mn-cs"/>
-              </a:defRPr>
-            </a:lvl4pPr>
-            <a:lvl5pPr marL="1828800" indent="0" algn="ctr" defTabSz="914400" rtl="0" eaLnBrk="1" latinLnBrk="0" hangingPunct="1">
-              <a:spcBef>
-                <a:spcPts val="600"/>
-              </a:spcBef>
-              <a:buFontTx/>
-              <a:buNone/>
-              <a:defRPr sz="1800" kern="1200">
-                <a:solidFill>
-                  <a:schemeClr val="tx1">
-                    <a:tint val="75000"/>
-                  </a:schemeClr>
-                </a:solidFill>
-                <a:effectLst>
-                  <a:outerShdw blurRad="50800" dist="50800" dir="5400000" sx="101000" sy="101000" algn="t" rotWithShape="0">
-                    <a:prstClr val="black">
-                      <a:alpha val="40000"/>
-                    </a:prstClr>
-                  </a:outerShdw>
-                </a:effectLst>
-                <a:latin typeface="+mn-lt"/>
-                <a:ea typeface="+mn-ea"/>
-                <a:cs typeface="+mn-cs"/>
-              </a:defRPr>
-            </a:lvl5pPr>
-            <a:lvl6pPr marL="2286000" indent="0" algn="ctr" defTabSz="914400" rtl="0" eaLnBrk="1" latinLnBrk="0" hangingPunct="1">
-              <a:spcBef>
-                <a:spcPct val="20000"/>
-              </a:spcBef>
-              <a:buFontTx/>
-              <a:buNone/>
-              <a:defRPr lang="en-US" sz="1800" kern="1200">
-                <a:solidFill>
-                  <a:schemeClr val="tx1">
-                    <a:tint val="75000"/>
-                  </a:schemeClr>
-                </a:solidFill>
-                <a:effectLst>
-                  <a:outerShdw blurRad="50800" dist="50800" dir="5400000" sx="101000" sy="101000" algn="t" rotWithShape="0">
-                    <a:prstClr val="black">
-                      <a:alpha val="40000"/>
-                    </a:prstClr>
-                  </a:outerShdw>
-                </a:effectLst>
-                <a:latin typeface="+mn-lt"/>
-                <a:ea typeface="+mn-ea"/>
-                <a:cs typeface="+mn-cs"/>
-              </a:defRPr>
-            </a:lvl6pPr>
-            <a:lvl7pPr marL="2743200" indent="0" algn="ctr" defTabSz="914400" rtl="0" eaLnBrk="1" latinLnBrk="0" hangingPunct="1">
-              <a:spcBef>
-                <a:spcPct val="20000"/>
-              </a:spcBef>
-              <a:buFontTx/>
-              <a:buNone/>
-              <a:defRPr lang="en-US" sz="1800" kern="1200">
-                <a:solidFill>
-                  <a:schemeClr val="tx1">
-                    <a:tint val="75000"/>
-                  </a:schemeClr>
-                </a:solidFill>
-                <a:effectLst>
-                  <a:outerShdw blurRad="50800" dist="50800" dir="5400000" sx="101000" sy="101000" algn="t" rotWithShape="0">
-                    <a:prstClr val="black">
-                      <a:alpha val="40000"/>
-                    </a:prstClr>
-                  </a:outerShdw>
-                </a:effectLst>
-                <a:latin typeface="+mn-lt"/>
-                <a:ea typeface="+mn-ea"/>
-                <a:cs typeface="+mn-cs"/>
-              </a:defRPr>
-            </a:lvl7pPr>
-            <a:lvl8pPr marL="3200400" indent="0" algn="ctr" defTabSz="914400" rtl="0" eaLnBrk="1" latinLnBrk="0" hangingPunct="1">
-              <a:spcBef>
-                <a:spcPct val="20000"/>
-              </a:spcBef>
-              <a:buFontTx/>
-              <a:buNone/>
-              <a:defRPr lang="en-US" sz="1800" kern="1200">
-                <a:solidFill>
-                  <a:schemeClr val="tx1">
-                    <a:tint val="75000"/>
-                  </a:schemeClr>
-                </a:solidFill>
-                <a:effectLst>
-                  <a:outerShdw blurRad="50800" dist="50800" dir="5400000" sx="101000" sy="101000" algn="t" rotWithShape="0">
-                    <a:prstClr val="black">
-                      <a:alpha val="40000"/>
-                    </a:prstClr>
-                  </a:outerShdw>
-                </a:effectLst>
-                <a:latin typeface="+mn-lt"/>
-                <a:ea typeface="+mn-ea"/>
-                <a:cs typeface="+mn-cs"/>
-              </a:defRPr>
-            </a:lvl8pPr>
-            <a:lvl9pPr marL="3657600" indent="0" algn="ctr" defTabSz="914400" rtl="0" eaLnBrk="1" latinLnBrk="0" hangingPunct="1">
-              <a:spcBef>
-                <a:spcPct val="20000"/>
-              </a:spcBef>
-              <a:buFontTx/>
-              <a:buNone/>
-              <a:defRPr lang="en-US" sz="1800" kern="1200">
-                <a:solidFill>
-                  <a:schemeClr val="tx1">
-                    <a:tint val="75000"/>
-                  </a:schemeClr>
-                </a:solidFill>
-                <a:effectLst>
-                  <a:outerShdw blurRad="50800" dist="50800" dir="5400000" sx="101000" sy="101000" algn="t" rotWithShape="0">
-                    <a:prstClr val="black">
-                      <a:alpha val="40000"/>
-                    </a:prstClr>
-                  </a:outerShdw>
-                </a:effectLst>
-                <a:latin typeface="+mn-lt"/>
-                <a:ea typeface="+mn-ea"/>
-                <a:cs typeface="+mn-cs"/>
-              </a:defRPr>
-            </a:lvl9pPr>
-          </a:lstStyle>
-          <a:p>
-            <a:pPr algn="r"/>
-            <a:r>
-              <a:rPr lang="en-US" altLang="zh-CN" sz="2800" dirty="0" smtClean="0"/>
-              <a:t>-</a:t>
-            </a:r>
-          </a:p>
-          <a:p>
-            <a:pPr algn="r"/>
-            <a:r>
-              <a:rPr lang="en-US" altLang="zh-CN" sz="2800" dirty="0" smtClean="0"/>
-              <a:t>-</a:t>
-            </a:r>
-            <a:endParaRPr lang="en-US" altLang="zh-CN" sz="2800" dirty="0"/>
-          </a:p>
-        </p:txBody>
-      </p:sp>
     </p:spTree>
     <p:extLst>
       <p:ext uri="{BB962C8B-B14F-4D97-AF65-F5344CB8AC3E}">
@@ -16310,7 +16056,7 @@
   <p:timing>
     <p:tnLst>
       <p:par>
-        <p:cTn xmlns:p14="http://schemas.microsoft.com/office/powerpoint/2010/main" id="1" dur="indefinite" restart="never" nodeType="tmRoot"/>
+        <p:cTn id="1" dur="indefinite" restart="never" nodeType="tmRoot"/>
       </p:par>
     </p:tnLst>
   </p:timing>
@@ -16497,7 +16243,7 @@
   <p:timing>
     <p:tnLst>
       <p:par>
-        <p:cTn xmlns:p14="http://schemas.microsoft.com/office/powerpoint/2010/main" id="1" dur="indefinite" restart="never" nodeType="tmRoot">
+        <p:cTn id="1" dur="indefinite" restart="never" nodeType="tmRoot">
           <p:childTnLst>
             <p:seq concurrent="1" nextAc="seek">
               <p:cTn id="2" dur="indefinite" nodeType="mainSeq">
@@ -17019,7 +16765,7 @@
         </p:nvSpPr>
         <p:spPr>
           <a:xfrm>
-            <a:off x="4385736" y="963049"/>
+            <a:off x="5516036" y="1025543"/>
             <a:ext cx="3234266" cy="669701"/>
           </a:xfrm>
         </p:spPr>
@@ -17035,16 +16781,9 @@
                 <a:latin typeface="Arial" panose="020B0604020202020204" pitchFamily="34" charset="0"/>
                 <a:cs typeface="Arial" panose="020B0604020202020204" pitchFamily="34" charset="0"/>
               </a:rPr>
-              <a:t>– </a:t>
+              <a:t>– Detail view</a:t>
             </a:r>
-            <a:r>
-              <a:rPr lang="en-IN" sz="2400" b="1" dirty="0" smtClean="0">
-                <a:latin typeface="Arial" panose="020B0604020202020204" pitchFamily="34" charset="0"/>
-                <a:cs typeface="Arial" panose="020B0604020202020204" pitchFamily="34" charset="0"/>
-              </a:rPr>
-              <a:t>Detail view</a:t>
-            </a:r>
-            <a:endParaRPr lang="en-IN" sz="2400" b="1" dirty="0">
+            <a:endParaRPr lang="en-IN" sz="2400" dirty="0">
               <a:latin typeface="Arial" panose="020B0604020202020204" pitchFamily="34" charset="0"/>
               <a:cs typeface="Arial" panose="020B0604020202020204" pitchFamily="34" charset="0"/>
             </a:endParaRPr>
@@ -17151,7 +16890,7 @@
         <p:spPr>
           <a:xfrm>
             <a:off x="685800" y="135467"/>
-            <a:ext cx="7770813" cy="1415427"/>
+            <a:ext cx="8318500" cy="1415427"/>
           </a:xfrm>
           <a:prstGeom prst="rect">
             <a:avLst/>
@@ -17214,7 +16953,7 @@
   <p:timing>
     <p:tnLst>
       <p:par>
-        <p:cTn xmlns:p14="http://schemas.microsoft.com/office/powerpoint/2010/main" id="1" dur="indefinite" restart="never" nodeType="tmRoot">
+        <p:cTn id="1" dur="indefinite" restart="never" nodeType="tmRoot">
           <p:childTnLst>
             <p:seq concurrent="1" nextAc="seek">
               <p:cTn id="2" dur="indefinite" nodeType="mainSeq">
@@ -17637,7 +17376,7 @@
   <p:timing>
     <p:tnLst>
       <p:par>
-        <p:cTn xmlns:p14="http://schemas.microsoft.com/office/powerpoint/2010/main" id="1" dur="indefinite" restart="never" nodeType="tmRoot"/>
+        <p:cTn id="1" dur="indefinite" restart="never" nodeType="tmRoot"/>
       </p:par>
     </p:tnLst>
   </p:timing>
@@ -17705,7 +17444,7 @@
   <p:timing>
     <p:tnLst>
       <p:par>
-        <p:cTn xmlns:p14="http://schemas.microsoft.com/office/powerpoint/2010/main" id="1" dur="indefinite" restart="never" nodeType="tmRoot"/>
+        <p:cTn id="1" dur="indefinite" restart="never" nodeType="tmRoot"/>
       </p:par>
     </p:tnLst>
   </p:timing>
@@ -17791,7 +17530,7 @@
   <p:timing>
     <p:tnLst>
       <p:par>
-        <p:cTn xmlns:p14="http://schemas.microsoft.com/office/powerpoint/2010/main" id="1" dur="indefinite" restart="never" nodeType="tmRoot"/>
+        <p:cTn id="1" dur="indefinite" restart="never" nodeType="tmRoot"/>
       </p:par>
     </p:tnLst>
   </p:timing>
@@ -17891,7 +17630,7 @@
   <p:timing>
     <p:tnLst>
       <p:par>
-        <p:cTn xmlns:p14="http://schemas.microsoft.com/office/powerpoint/2010/main" id="1" dur="indefinite" restart="never" nodeType="tmRoot"/>
+        <p:cTn id="1" dur="indefinite" restart="never" nodeType="tmRoot"/>
       </p:par>
     </p:tnLst>
   </p:timing>
@@ -17925,9 +17664,16 @@
             <p:ph type="title"/>
           </p:nvPr>
         </p:nvSpPr>
-        <p:spPr/>
+        <p:spPr>
+          <a:xfrm>
+            <a:off x="685800" y="121023"/>
+            <a:ext cx="8051800" cy="1429871"/>
+          </a:xfrm>
+        </p:spPr>
         <p:txBody>
-          <a:bodyPr/>
+          <a:bodyPr>
+            <a:normAutofit fontScale="90000"/>
+          </a:bodyPr>
           <a:lstStyle/>
           <a:p>
             <a:pPr algn="l"/>
@@ -17977,7 +17723,7 @@
   <p:timing>
     <p:tnLst>
       <p:par>
-        <p:cTn xmlns:p14="http://schemas.microsoft.com/office/powerpoint/2010/main" id="1" dur="indefinite" restart="never" nodeType="tmRoot"/>
+        <p:cTn id="1" dur="indefinite" restart="never" nodeType="tmRoot"/>
       </p:par>
     </p:tnLst>
   </p:timing>
@@ -18208,11 +17954,11 @@
   <p:clrMapOvr>
     <a:masterClrMapping/>
   </p:clrMapOvr>
-  <p:transition xmlns:p14="http://schemas.microsoft.com/office/powerpoint/2010/main" spd="med"/>
+  <p:transition spd="med"/>
   <p:timing>
     <p:tnLst>
       <p:par>
-        <p:cTn xmlns:p14="http://schemas.microsoft.com/office/powerpoint/2010/main" id="1" dur="indefinite" restart="never" nodeType="tmRoot"/>
+        <p:cTn id="1" dur="indefinite" restart="never" nodeType="tmRoot"/>
       </p:par>
     </p:tnLst>
   </p:timing>
@@ -18418,11 +18164,11 @@
   <p:clrMapOvr>
     <a:masterClrMapping/>
   </p:clrMapOvr>
-  <p:transition xmlns:p14="http://schemas.microsoft.com/office/powerpoint/2010/main" spd="med"/>
+  <p:transition spd="med"/>
   <p:timing>
     <p:tnLst>
       <p:par>
-        <p:cTn xmlns:p14="http://schemas.microsoft.com/office/powerpoint/2010/main" id="1" dur="indefinite" restart="never" nodeType="tmRoot"/>
+        <p:cTn id="1" dur="indefinite" restart="never" nodeType="tmRoot"/>
       </p:par>
     </p:tnLst>
   </p:timing>
@@ -18550,11 +18296,11 @@
   <p:clrMapOvr>
     <a:masterClrMapping/>
   </p:clrMapOvr>
-  <p:transition xmlns:p14="http://schemas.microsoft.com/office/powerpoint/2010/main" spd="med"/>
+  <p:transition spd="med"/>
   <p:timing>
     <p:tnLst>
       <p:par>
-        <p:cTn xmlns:p14="http://schemas.microsoft.com/office/powerpoint/2010/main" id="1" dur="indefinite" restart="never" nodeType="tmRoot"/>
+        <p:cTn id="1" dur="indefinite" restart="never" nodeType="tmRoot"/>
       </p:par>
     </p:tnLst>
   </p:timing>
@@ -18637,7 +18383,7 @@
   <p:timing>
     <p:tnLst>
       <p:par>
-        <p:cTn xmlns:p14="http://schemas.microsoft.com/office/powerpoint/2010/main" id="1" dur="indefinite" restart="never" nodeType="tmRoot"/>
+        <p:cTn id="1" dur="indefinite" restart="never" nodeType="tmRoot"/>
       </p:par>
     </p:tnLst>
   </p:timing>
@@ -18679,11 +18425,7 @@
             <a:pPr algn="l"/>
             <a:r>
               <a:rPr lang="en-US" dirty="0" smtClean="0"/>
-              <a:t>8. </a:t>
-            </a:r>
-            <a:r>
-              <a:rPr lang="en-US" dirty="0" smtClean="0"/>
-              <a:t>Test for Team Profile</a:t>
+              <a:t>8. Test for Team Profile</a:t>
             </a:r>
             <a:endParaRPr lang="en-US" dirty="0"/>
           </a:p>
@@ -18696,13 +18438,13 @@
           <p:nvPr>
             <p:extLst>
               <p:ext uri="{D42A27DB-BD31-4B8C-83A1-F6EECF244321}">
-                <p14:modId xmlns:p14="http://schemas.microsoft.com/office/powerpoint/2010/main" val="50037447"/>
+                <p14:modId xmlns:p14="http://schemas.microsoft.com/office/powerpoint/2010/main" val="1887187417"/>
               </p:ext>
             </p:extLst>
           </p:nvPr>
         </p:nvGraphicFramePr>
         <p:xfrm>
-          <a:off x="1373188" y="1498594"/>
+          <a:off x="1373188" y="1739894"/>
           <a:ext cx="7401772" cy="4851400"/>
         </p:xfrm>
         <a:graphic>
@@ -18719,7 +18461,7 @@
         </p:nvSpPr>
         <p:spPr>
           <a:xfrm>
-            <a:off x="7281341" y="1267761"/>
+            <a:off x="7281341" y="1509061"/>
             <a:ext cx="1493618" cy="461665"/>
           </a:xfrm>
           <a:prstGeom prst="rect">
@@ -18754,7 +18496,7 @@
   <p:timing>
     <p:tnLst>
       <p:par>
-        <p:cTn xmlns:p14="http://schemas.microsoft.com/office/powerpoint/2010/main" id="1" dur="indefinite" restart="never" nodeType="tmRoot"/>
+        <p:cTn id="1" dur="indefinite" restart="never" nodeType="tmRoot"/>
       </p:par>
     </p:tnLst>
   </p:timing>

</xml_diff>